<commit_message>
cours et exercices sur les paramètres du main
</commit_message>
<xml_diff>
--- a/02_C/04_Pointeurs/Pointeurs.pptx
+++ b/02_C/04_Pointeurs/Pointeurs.pptx
@@ -5,7 +5,7 @@
     <p:sldMasterId id="2147483648" r:id="rId1"/>
   </p:sldMasterIdLst>
   <p:notesMasterIdLst>
-    <p:notesMasterId r:id="rId21"/>
+    <p:notesMasterId r:id="rId24"/>
   </p:notesMasterIdLst>
   <p:sldIdLst>
     <p:sldId id="256" r:id="rId2"/>
@@ -27,6 +27,9 @@
     <p:sldId id="321" r:id="rId18"/>
     <p:sldId id="322" r:id="rId19"/>
     <p:sldId id="323" r:id="rId20"/>
+    <p:sldId id="324" r:id="rId21"/>
+    <p:sldId id="325" r:id="rId22"/>
+    <p:sldId id="326" r:id="rId23"/>
   </p:sldIdLst>
   <p:sldSz cx="12192000" cy="6858000"/>
   <p:notesSz cx="6858000" cy="9144000"/>
@@ -215,7 +218,7 @@
           <a:p>
             <a:fld id="{D5ED8D76-713F-4517-A742-EE2E39F4A4C8}" type="datetimeFigureOut">
               <a:rPr lang="fr-FR" smtClean="0"/>
-              <a:t>01/12/2020</a:t>
+              <a:t>30/11/2020</a:t>
             </a:fld>
             <a:endParaRPr lang="fr-FR"/>
           </a:p>
@@ -593,6 +596,90 @@
 </p:notes>
 </file>
 
+<file path=ppt/notesSlides/notesSlide10.xml><?xml version="1.0" encoding="utf-8"?>
+<p:notes xmlns:a="http://schemas.openxmlformats.org/drawingml/2006/main" xmlns:r="http://schemas.openxmlformats.org/officeDocument/2006/relationships" xmlns:p="http://schemas.openxmlformats.org/presentationml/2006/main">
+  <p:cSld>
+    <p:spTree>
+      <p:nvGrpSpPr>
+        <p:cNvPr id="1" name=""/>
+        <p:cNvGrpSpPr/>
+        <p:nvPr/>
+      </p:nvGrpSpPr>
+      <p:grpSpPr>
+        <a:xfrm>
+          <a:off x="0" y="0"/>
+          <a:ext cx="0" cy="0"/>
+          <a:chOff x="0" y="0"/>
+          <a:chExt cx="0" cy="0"/>
+        </a:xfrm>
+      </p:grpSpPr>
+      <p:sp>
+        <p:nvSpPr>
+          <p:cNvPr id="2" name="Espace réservé de l'image des diapositives 1"/>
+          <p:cNvSpPr>
+            <a:spLocks noGrp="1" noRot="1" noChangeAspect="1"/>
+          </p:cNvSpPr>
+          <p:nvPr>
+            <p:ph type="sldImg"/>
+          </p:nvPr>
+        </p:nvSpPr>
+        <p:spPr/>
+      </p:sp>
+      <p:sp>
+        <p:nvSpPr>
+          <p:cNvPr id="3" name="Espace réservé des notes 2"/>
+          <p:cNvSpPr>
+            <a:spLocks noGrp="1"/>
+          </p:cNvSpPr>
+          <p:nvPr>
+            <p:ph type="body" idx="1"/>
+          </p:nvPr>
+        </p:nvSpPr>
+        <p:spPr/>
+        <p:txBody>
+          <a:bodyPr/>
+          <a:lstStyle/>
+          <a:p>
+            <a:endParaRPr lang="fr-FR" dirty="0"/>
+          </a:p>
+        </p:txBody>
+      </p:sp>
+      <p:sp>
+        <p:nvSpPr>
+          <p:cNvPr id="4" name="Espace réservé du numéro de diapositive 3"/>
+          <p:cNvSpPr>
+            <a:spLocks noGrp="1"/>
+          </p:cNvSpPr>
+          <p:nvPr>
+            <p:ph type="sldNum" sz="quarter" idx="5"/>
+          </p:nvPr>
+        </p:nvSpPr>
+        <p:spPr/>
+        <p:txBody>
+          <a:bodyPr/>
+          <a:lstStyle/>
+          <a:p>
+            <a:fld id="{DD49D575-1464-4189-AD25-C980A41AA229}" type="slidenum">
+              <a:rPr lang="fr-FR" smtClean="0"/>
+              <a:t>22</a:t>
+            </a:fld>
+            <a:endParaRPr lang="fr-FR"/>
+          </a:p>
+        </p:txBody>
+      </p:sp>
+    </p:spTree>
+    <p:extLst>
+      <p:ext uri="{BB962C8B-B14F-4D97-AF65-F5344CB8AC3E}">
+        <p14:creationId xmlns:p14="http://schemas.microsoft.com/office/powerpoint/2010/main" val="324383312"/>
+      </p:ext>
+    </p:extLst>
+  </p:cSld>
+  <p:clrMapOvr>
+    <a:masterClrMapping/>
+  </p:clrMapOvr>
+</p:notes>
+</file>
+
 <file path=ppt/notesSlides/notesSlide2.xml><?xml version="1.0" encoding="utf-8"?>
 <p:notes xmlns:a="http://schemas.openxmlformats.org/drawingml/2006/main" xmlns:r="http://schemas.openxmlformats.org/officeDocument/2006/relationships" xmlns:p="http://schemas.openxmlformats.org/presentationml/2006/main">
   <p:cSld>
@@ -1412,7 +1499,7 @@
           <a:p>
             <a:fld id="{7A779115-4B9C-40CC-B7C8-E0257608131C}" type="datetimeFigureOut">
               <a:rPr lang="fr-FR" smtClean="0"/>
-              <a:t>01/12/2020</a:t>
+              <a:t>30/11/2020</a:t>
             </a:fld>
             <a:endParaRPr lang="fr-FR"/>
           </a:p>
@@ -1610,7 +1697,7 @@
           <a:p>
             <a:fld id="{7A779115-4B9C-40CC-B7C8-E0257608131C}" type="datetimeFigureOut">
               <a:rPr lang="fr-FR" smtClean="0"/>
-              <a:t>01/12/2020</a:t>
+              <a:t>30/11/2020</a:t>
             </a:fld>
             <a:endParaRPr lang="fr-FR"/>
           </a:p>
@@ -1818,7 +1905,7 @@
           <a:p>
             <a:fld id="{7A779115-4B9C-40CC-B7C8-E0257608131C}" type="datetimeFigureOut">
               <a:rPr lang="fr-FR" smtClean="0"/>
-              <a:t>01/12/2020</a:t>
+              <a:t>30/11/2020</a:t>
             </a:fld>
             <a:endParaRPr lang="fr-FR"/>
           </a:p>
@@ -2016,7 +2103,7 @@
           <a:p>
             <a:fld id="{7A779115-4B9C-40CC-B7C8-E0257608131C}" type="datetimeFigureOut">
               <a:rPr lang="fr-FR" smtClean="0"/>
-              <a:t>01/12/2020</a:t>
+              <a:t>30/11/2020</a:t>
             </a:fld>
             <a:endParaRPr lang="fr-FR"/>
           </a:p>
@@ -2291,7 +2378,7 @@
           <a:p>
             <a:fld id="{7A779115-4B9C-40CC-B7C8-E0257608131C}" type="datetimeFigureOut">
               <a:rPr lang="fr-FR" smtClean="0"/>
-              <a:t>01/12/2020</a:t>
+              <a:t>30/11/2020</a:t>
             </a:fld>
             <a:endParaRPr lang="fr-FR"/>
           </a:p>
@@ -2556,7 +2643,7 @@
           <a:p>
             <a:fld id="{7A779115-4B9C-40CC-B7C8-E0257608131C}" type="datetimeFigureOut">
               <a:rPr lang="fr-FR" smtClean="0"/>
-              <a:t>01/12/2020</a:t>
+              <a:t>30/11/2020</a:t>
             </a:fld>
             <a:endParaRPr lang="fr-FR"/>
           </a:p>
@@ -2968,7 +3055,7 @@
           <a:p>
             <a:fld id="{7A779115-4B9C-40CC-B7C8-E0257608131C}" type="datetimeFigureOut">
               <a:rPr lang="fr-FR" smtClean="0"/>
-              <a:t>01/12/2020</a:t>
+              <a:t>30/11/2020</a:t>
             </a:fld>
             <a:endParaRPr lang="fr-FR"/>
           </a:p>
@@ -3109,7 +3196,7 @@
           <a:p>
             <a:fld id="{7A779115-4B9C-40CC-B7C8-E0257608131C}" type="datetimeFigureOut">
               <a:rPr lang="fr-FR" smtClean="0"/>
-              <a:t>01/12/2020</a:t>
+              <a:t>30/11/2020</a:t>
             </a:fld>
             <a:endParaRPr lang="fr-FR"/>
           </a:p>
@@ -3222,7 +3309,7 @@
           <a:p>
             <a:fld id="{7A779115-4B9C-40CC-B7C8-E0257608131C}" type="datetimeFigureOut">
               <a:rPr lang="fr-FR" smtClean="0"/>
-              <a:t>01/12/2020</a:t>
+              <a:t>30/11/2020</a:t>
             </a:fld>
             <a:endParaRPr lang="fr-FR"/>
           </a:p>
@@ -3533,7 +3620,7 @@
           <a:p>
             <a:fld id="{7A779115-4B9C-40CC-B7C8-E0257608131C}" type="datetimeFigureOut">
               <a:rPr lang="fr-FR" smtClean="0"/>
-              <a:t>01/12/2020</a:t>
+              <a:t>30/11/2020</a:t>
             </a:fld>
             <a:endParaRPr lang="fr-FR"/>
           </a:p>
@@ -3821,7 +3908,7 @@
           <a:p>
             <a:fld id="{7A779115-4B9C-40CC-B7C8-E0257608131C}" type="datetimeFigureOut">
               <a:rPr lang="fr-FR" smtClean="0"/>
-              <a:t>01/12/2020</a:t>
+              <a:t>30/11/2020</a:t>
             </a:fld>
             <a:endParaRPr lang="fr-FR"/>
           </a:p>
@@ -4062,7 +4149,7 @@
           <a:p>
             <a:fld id="{7A779115-4B9C-40CC-B7C8-E0257608131C}" type="datetimeFigureOut">
               <a:rPr lang="fr-FR" smtClean="0"/>
-              <a:t>01/12/2020</a:t>
+              <a:t>30/11/2020</a:t>
             </a:fld>
             <a:endParaRPr lang="fr-FR"/>
           </a:p>
@@ -18606,6 +18693,3299 @@
 </p:sld>
 </file>
 
+<file path=ppt/slides/slide20.xml><?xml version="1.0" encoding="utf-8"?>
+<p:sld xmlns:a="http://schemas.openxmlformats.org/drawingml/2006/main" xmlns:r="http://schemas.openxmlformats.org/officeDocument/2006/relationships" xmlns:p="http://schemas.openxmlformats.org/presentationml/2006/main">
+  <p:cSld>
+    <p:spTree>
+      <p:nvGrpSpPr>
+        <p:cNvPr id="1" name=""/>
+        <p:cNvGrpSpPr/>
+        <p:nvPr/>
+      </p:nvGrpSpPr>
+      <p:grpSpPr>
+        <a:xfrm>
+          <a:off x="0" y="0"/>
+          <a:ext cx="0" cy="0"/>
+          <a:chOff x="0" y="0"/>
+          <a:chExt cx="0" cy="0"/>
+        </a:xfrm>
+      </p:grpSpPr>
+      <p:sp>
+        <p:nvSpPr>
+          <p:cNvPr id="2" name="Titre 1">
+            <a:extLst>
+              <a:ext uri="{FF2B5EF4-FFF2-40B4-BE49-F238E27FC236}">
+                <a16:creationId xmlns:a16="http://schemas.microsoft.com/office/drawing/2014/main" id="{D349B61F-745E-4BF8-A4EE-8D66E7E4C790}"/>
+              </a:ext>
+            </a:extLst>
+          </p:cNvPr>
+          <p:cNvSpPr>
+            <a:spLocks noGrp="1"/>
+          </p:cNvSpPr>
+          <p:nvPr>
+            <p:ph type="title"/>
+          </p:nvPr>
+        </p:nvSpPr>
+        <p:spPr/>
+        <p:txBody>
+          <a:bodyPr/>
+          <a:lstStyle/>
+          <a:p>
+            <a:endParaRPr lang="fr-FR" dirty="0"/>
+          </a:p>
+        </p:txBody>
+      </p:sp>
+      <p:sp>
+        <p:nvSpPr>
+          <p:cNvPr id="3" name="Espace réservé du contenu 2">
+            <a:extLst>
+              <a:ext uri="{FF2B5EF4-FFF2-40B4-BE49-F238E27FC236}">
+                <a16:creationId xmlns:a16="http://schemas.microsoft.com/office/drawing/2014/main" id="{FEAD0D27-975B-4AFB-91E4-9779FD84F263}"/>
+              </a:ext>
+            </a:extLst>
+          </p:cNvPr>
+          <p:cNvSpPr>
+            <a:spLocks noGrp="1"/>
+          </p:cNvSpPr>
+          <p:nvPr>
+            <p:ph idx="1"/>
+          </p:nvPr>
+        </p:nvSpPr>
+        <p:spPr/>
+        <p:txBody>
+          <a:bodyPr/>
+          <a:lstStyle/>
+          <a:p>
+            <a:pPr marL="0" indent="0">
+              <a:buNone/>
+            </a:pPr>
+            <a:endParaRPr lang="fr-FR" dirty="0"/>
+          </a:p>
+        </p:txBody>
+      </p:sp>
+      <p:pic>
+        <p:nvPicPr>
+          <p:cNvPr id="4" name="Image 3">
+            <a:extLst>
+              <a:ext uri="{FF2B5EF4-FFF2-40B4-BE49-F238E27FC236}">
+                <a16:creationId xmlns:a16="http://schemas.microsoft.com/office/drawing/2014/main" id="{F8535AAA-041A-40B4-8EA6-DD4E7BA7537B}"/>
+              </a:ext>
+            </a:extLst>
+          </p:cNvPr>
+          <p:cNvPicPr>
+            <a:picLocks noChangeAspect="1"/>
+          </p:cNvPicPr>
+          <p:nvPr/>
+        </p:nvPicPr>
+        <p:blipFill>
+          <a:blip r:embed="rId2"/>
+          <a:stretch>
+            <a:fillRect/>
+          </a:stretch>
+        </p:blipFill>
+        <p:spPr>
+          <a:xfrm>
+            <a:off x="1673262" y="365125"/>
+            <a:ext cx="10161184" cy="10112797"/>
+          </a:xfrm>
+          <a:prstGeom prst="rect">
+            <a:avLst/>
+          </a:prstGeom>
+        </p:spPr>
+      </p:pic>
+      <p:sp>
+        <p:nvSpPr>
+          <p:cNvPr id="5" name="Bulle narrative : rectangle à coins arrondis 4">
+            <a:extLst>
+              <a:ext uri="{FF2B5EF4-FFF2-40B4-BE49-F238E27FC236}">
+                <a16:creationId xmlns:a16="http://schemas.microsoft.com/office/drawing/2014/main" id="{2A3CCA3B-E034-4F54-8646-981DBD00E06B}"/>
+              </a:ext>
+            </a:extLst>
+          </p:cNvPr>
+          <p:cNvSpPr/>
+          <p:nvPr/>
+        </p:nvSpPr>
+        <p:spPr>
+          <a:xfrm>
+            <a:off x="192389" y="1484831"/>
+            <a:ext cx="5352626" cy="1570891"/>
+          </a:xfrm>
+          <a:prstGeom prst="wedgeRoundRectCallout">
+            <a:avLst>
+              <a:gd name="adj1" fmla="val -44661"/>
+              <a:gd name="adj2" fmla="val 109459"/>
+              <a:gd name="adj3" fmla="val 16667"/>
+            </a:avLst>
+          </a:prstGeom>
+          <a:ln w="57150"/>
+        </p:spPr>
+        <p:style>
+          <a:lnRef idx="2">
+            <a:schemeClr val="dk1"/>
+          </a:lnRef>
+          <a:fillRef idx="1">
+            <a:schemeClr val="lt1"/>
+          </a:fillRef>
+          <a:effectRef idx="0">
+            <a:schemeClr val="dk1"/>
+          </a:effectRef>
+          <a:fontRef idx="minor">
+            <a:schemeClr val="dk1"/>
+          </a:fontRef>
+        </p:style>
+        <p:txBody>
+          <a:bodyPr lIns="144000" tIns="144000" rIns="144000" bIns="0" rtlCol="0" anchor="ctr"/>
+          <a:lstStyle/>
+          <a:p>
+            <a:pPr algn="ctr">
+              <a:lnSpc>
+                <a:spcPts val="4000"/>
+              </a:lnSpc>
+            </a:pPr>
+            <a:r>
+              <a:rPr lang="fr-FR" sz="5400" dirty="0">
+                <a:solidFill>
+                  <a:schemeClr val="dk1"/>
+                </a:solidFill>
+                <a:latin typeface="meatloaf solid" pitchFamily="2" charset="0"/>
+              </a:rPr>
+              <a:t>Avez-vous déjà remarqué ce genre de paramètres ?</a:t>
+            </a:r>
+          </a:p>
+        </p:txBody>
+      </p:sp>
+      <p:sp>
+        <p:nvSpPr>
+          <p:cNvPr id="6" name="Rectangle 5">
+            <a:extLst>
+              <a:ext uri="{FF2B5EF4-FFF2-40B4-BE49-F238E27FC236}">
+                <a16:creationId xmlns:a16="http://schemas.microsoft.com/office/drawing/2014/main" id="{0B1EC566-8A22-4A42-80EF-E8225448F048}"/>
+              </a:ext>
+            </a:extLst>
+          </p:cNvPr>
+          <p:cNvSpPr/>
+          <p:nvPr/>
+        </p:nvSpPr>
+        <p:spPr>
+          <a:xfrm>
+            <a:off x="8464062" y="3751385"/>
+            <a:ext cx="2801816" cy="527538"/>
+          </a:xfrm>
+          <a:prstGeom prst="rect">
+            <a:avLst/>
+          </a:prstGeom>
+          <a:noFill/>
+          <a:ln w="76200">
+            <a:solidFill>
+              <a:srgbClr val="FF0000"/>
+            </a:solidFill>
+          </a:ln>
+        </p:spPr>
+        <p:style>
+          <a:lnRef idx="2">
+            <a:schemeClr val="accent1">
+              <a:shade val="50000"/>
+            </a:schemeClr>
+          </a:lnRef>
+          <a:fillRef idx="1">
+            <a:schemeClr val="accent1"/>
+          </a:fillRef>
+          <a:effectRef idx="0">
+            <a:schemeClr val="accent1"/>
+          </a:effectRef>
+          <a:fontRef idx="minor">
+            <a:schemeClr val="lt1"/>
+          </a:fontRef>
+        </p:style>
+        <p:txBody>
+          <a:bodyPr rtlCol="0" anchor="ctr"/>
+          <a:lstStyle/>
+          <a:p>
+            <a:pPr algn="ctr"/>
+            <a:endParaRPr lang="fr-FR"/>
+          </a:p>
+        </p:txBody>
+      </p:sp>
+    </p:spTree>
+    <p:extLst>
+      <p:ext uri="{BB962C8B-B14F-4D97-AF65-F5344CB8AC3E}">
+        <p14:creationId xmlns:p14="http://schemas.microsoft.com/office/powerpoint/2010/main" val="1676889863"/>
+      </p:ext>
+    </p:extLst>
+  </p:cSld>
+  <p:clrMapOvr>
+    <a:masterClrMapping/>
+  </p:clrMapOvr>
+  <p:timing>
+    <p:tnLst>
+      <p:par>
+        <p:cTn id="1" dur="indefinite" restart="never" nodeType="tmRoot">
+          <p:childTnLst>
+            <p:seq concurrent="1" nextAc="seek">
+              <p:cTn id="2" dur="indefinite" nodeType="mainSeq">
+                <p:childTnLst>
+                  <p:par>
+                    <p:cTn id="3" fill="hold">
+                      <p:stCondLst>
+                        <p:cond delay="indefinite"/>
+                      </p:stCondLst>
+                      <p:childTnLst>
+                        <p:par>
+                          <p:cTn id="4" fill="hold">
+                            <p:stCondLst>
+                              <p:cond delay="0"/>
+                            </p:stCondLst>
+                            <p:childTnLst>
+                              <p:par>
+                                <p:cTn id="5" presetID="10" presetClass="entr" presetSubtype="0" fill="hold" grpId="0" nodeType="clickEffect">
+                                  <p:stCondLst>
+                                    <p:cond delay="0"/>
+                                  </p:stCondLst>
+                                  <p:childTnLst>
+                                    <p:set>
+                                      <p:cBhvr>
+                                        <p:cTn id="6" dur="1" fill="hold">
+                                          <p:stCondLst>
+                                            <p:cond delay="0"/>
+                                          </p:stCondLst>
+                                        </p:cTn>
+                                        <p:tgtEl>
+                                          <p:spTgt spid="5"/>
+                                        </p:tgtEl>
+                                        <p:attrNameLst>
+                                          <p:attrName>style.visibility</p:attrName>
+                                        </p:attrNameLst>
+                                      </p:cBhvr>
+                                      <p:to>
+                                        <p:strVal val="visible"/>
+                                      </p:to>
+                                    </p:set>
+                                    <p:animEffect transition="in" filter="fade">
+                                      <p:cBhvr>
+                                        <p:cTn id="7" dur="500"/>
+                                        <p:tgtEl>
+                                          <p:spTgt spid="5"/>
+                                        </p:tgtEl>
+                                      </p:cBhvr>
+                                    </p:animEffect>
+                                  </p:childTnLst>
+                                </p:cTn>
+                              </p:par>
+                            </p:childTnLst>
+                          </p:cTn>
+                        </p:par>
+                      </p:childTnLst>
+                    </p:cTn>
+                  </p:par>
+                  <p:par>
+                    <p:cTn id="8" fill="hold">
+                      <p:stCondLst>
+                        <p:cond delay="indefinite"/>
+                      </p:stCondLst>
+                      <p:childTnLst>
+                        <p:par>
+                          <p:cTn id="9" fill="hold">
+                            <p:stCondLst>
+                              <p:cond delay="0"/>
+                            </p:stCondLst>
+                            <p:childTnLst>
+                              <p:par>
+                                <p:cTn id="10" presetID="10" presetClass="entr" presetSubtype="0" fill="hold" grpId="0" nodeType="clickEffect">
+                                  <p:stCondLst>
+                                    <p:cond delay="0"/>
+                                  </p:stCondLst>
+                                  <p:childTnLst>
+                                    <p:set>
+                                      <p:cBhvr>
+                                        <p:cTn id="11" dur="1" fill="hold">
+                                          <p:stCondLst>
+                                            <p:cond delay="0"/>
+                                          </p:stCondLst>
+                                        </p:cTn>
+                                        <p:tgtEl>
+                                          <p:spTgt spid="6"/>
+                                        </p:tgtEl>
+                                        <p:attrNameLst>
+                                          <p:attrName>style.visibility</p:attrName>
+                                        </p:attrNameLst>
+                                      </p:cBhvr>
+                                      <p:to>
+                                        <p:strVal val="visible"/>
+                                      </p:to>
+                                    </p:set>
+                                    <p:animEffect transition="in" filter="fade">
+                                      <p:cBhvr>
+                                        <p:cTn id="12" dur="500"/>
+                                        <p:tgtEl>
+                                          <p:spTgt spid="6"/>
+                                        </p:tgtEl>
+                                      </p:cBhvr>
+                                    </p:animEffect>
+                                  </p:childTnLst>
+                                </p:cTn>
+                              </p:par>
+                            </p:childTnLst>
+                          </p:cTn>
+                        </p:par>
+                      </p:childTnLst>
+                    </p:cTn>
+                  </p:par>
+                </p:childTnLst>
+              </p:cTn>
+              <p:prevCondLst>
+                <p:cond evt="onPrev" delay="0">
+                  <p:tgtEl>
+                    <p:sldTgt/>
+                  </p:tgtEl>
+                </p:cond>
+              </p:prevCondLst>
+              <p:nextCondLst>
+                <p:cond evt="onNext" delay="0">
+                  <p:tgtEl>
+                    <p:sldTgt/>
+                  </p:tgtEl>
+                </p:cond>
+              </p:nextCondLst>
+            </p:seq>
+          </p:childTnLst>
+        </p:cTn>
+      </p:par>
+    </p:tnLst>
+    <p:bldLst>
+      <p:bldP spid="5" grpId="0" animBg="1"/>
+      <p:bldP spid="6" grpId="0" animBg="1"/>
+    </p:bldLst>
+  </p:timing>
+</p:sld>
+</file>
+
+<file path=ppt/slides/slide21.xml><?xml version="1.0" encoding="utf-8"?>
+<p:sld xmlns:a="http://schemas.openxmlformats.org/drawingml/2006/main" xmlns:r="http://schemas.openxmlformats.org/officeDocument/2006/relationships" xmlns:p="http://schemas.openxmlformats.org/presentationml/2006/main">
+  <p:cSld>
+    <p:spTree>
+      <p:nvGrpSpPr>
+        <p:cNvPr id="1" name=""/>
+        <p:cNvGrpSpPr/>
+        <p:nvPr/>
+      </p:nvGrpSpPr>
+      <p:grpSpPr>
+        <a:xfrm>
+          <a:off x="0" y="0"/>
+          <a:ext cx="0" cy="0"/>
+          <a:chOff x="0" y="0"/>
+          <a:chExt cx="0" cy="0"/>
+        </a:xfrm>
+      </p:grpSpPr>
+      <p:sp>
+        <p:nvSpPr>
+          <p:cNvPr id="2" name="Titre 1">
+            <a:extLst>
+              <a:ext uri="{FF2B5EF4-FFF2-40B4-BE49-F238E27FC236}">
+                <a16:creationId xmlns:a16="http://schemas.microsoft.com/office/drawing/2014/main" id="{D349B61F-745E-4BF8-A4EE-8D66E7E4C790}"/>
+              </a:ext>
+            </a:extLst>
+          </p:cNvPr>
+          <p:cNvSpPr>
+            <a:spLocks noGrp="1"/>
+          </p:cNvSpPr>
+          <p:nvPr>
+            <p:ph type="title"/>
+          </p:nvPr>
+        </p:nvSpPr>
+        <p:spPr/>
+        <p:txBody>
+          <a:bodyPr/>
+          <a:lstStyle/>
+          <a:p>
+            <a:r>
+              <a:rPr lang="fr-FR" dirty="0"/>
+              <a:t>Paramètres du main()</a:t>
+            </a:r>
+          </a:p>
+        </p:txBody>
+      </p:sp>
+      <p:sp>
+        <p:nvSpPr>
+          <p:cNvPr id="3" name="Espace réservé du contenu 2">
+            <a:extLst>
+              <a:ext uri="{FF2B5EF4-FFF2-40B4-BE49-F238E27FC236}">
+                <a16:creationId xmlns:a16="http://schemas.microsoft.com/office/drawing/2014/main" id="{FEAD0D27-975B-4AFB-91E4-9779FD84F263}"/>
+              </a:ext>
+            </a:extLst>
+          </p:cNvPr>
+          <p:cNvSpPr>
+            <a:spLocks noGrp="1"/>
+          </p:cNvSpPr>
+          <p:nvPr>
+            <p:ph idx="1"/>
+          </p:nvPr>
+        </p:nvSpPr>
+        <p:spPr>
+          <a:xfrm>
+            <a:off x="838200" y="1825625"/>
+            <a:ext cx="3804138" cy="4351338"/>
+          </a:xfrm>
+        </p:spPr>
+        <p:txBody>
+          <a:bodyPr/>
+          <a:lstStyle/>
+          <a:p>
+            <a:pPr marL="0" indent="0">
+              <a:buNone/>
+            </a:pPr>
+            <a:r>
+              <a:rPr lang="fr-FR" b="0" dirty="0" err="1">
+                <a:solidFill>
+                  <a:srgbClr val="D73A49"/>
+                </a:solidFill>
+                <a:effectLst/>
+                <a:latin typeface="Consolas" panose="020B0609020204030204" pitchFamily="49" charset="0"/>
+              </a:rPr>
+              <a:t>int</a:t>
+            </a:r>
+            <a:r>
+              <a:rPr lang="fr-FR" b="0" dirty="0">
+                <a:solidFill>
+                  <a:srgbClr val="24292E"/>
+                </a:solidFill>
+                <a:effectLst/>
+                <a:latin typeface="Consolas" panose="020B0609020204030204" pitchFamily="49" charset="0"/>
+              </a:rPr>
+              <a:t> </a:t>
+            </a:r>
+            <a:r>
+              <a:rPr lang="fr-FR" b="0" dirty="0">
+                <a:solidFill>
+                  <a:srgbClr val="6F42C1"/>
+                </a:solidFill>
+                <a:effectLst/>
+                <a:latin typeface="Consolas" panose="020B0609020204030204" pitchFamily="49" charset="0"/>
+              </a:rPr>
+              <a:t>main</a:t>
+            </a:r>
+            <a:r>
+              <a:rPr lang="fr-FR" b="0" dirty="0">
+                <a:solidFill>
+                  <a:srgbClr val="24292E"/>
+                </a:solidFill>
+                <a:effectLst/>
+                <a:latin typeface="Consolas" panose="020B0609020204030204" pitchFamily="49" charset="0"/>
+              </a:rPr>
+              <a:t>() {</a:t>
+            </a:r>
+          </a:p>
+          <a:p>
+            <a:pPr marL="0" indent="0">
+              <a:buNone/>
+            </a:pPr>
+            <a:r>
+              <a:rPr lang="fr-FR" dirty="0">
+                <a:solidFill>
+                  <a:srgbClr val="24292E"/>
+                </a:solidFill>
+                <a:latin typeface="Consolas" panose="020B0609020204030204" pitchFamily="49" charset="0"/>
+              </a:rPr>
+              <a:t>	...</a:t>
+            </a:r>
+            <a:r>
+              <a:rPr lang="fr-FR" b="0" dirty="0">
+                <a:solidFill>
+                  <a:srgbClr val="24292E"/>
+                </a:solidFill>
+                <a:effectLst/>
+                <a:latin typeface="Consolas" panose="020B0609020204030204" pitchFamily="49" charset="0"/>
+              </a:rPr>
+              <a:t> </a:t>
+            </a:r>
+          </a:p>
+          <a:p>
+            <a:pPr marL="0" indent="0">
+              <a:buNone/>
+            </a:pPr>
+            <a:r>
+              <a:rPr lang="fr-FR" b="0" dirty="0">
+                <a:solidFill>
+                  <a:srgbClr val="24292E"/>
+                </a:solidFill>
+                <a:effectLst/>
+                <a:latin typeface="Consolas" panose="020B0609020204030204" pitchFamily="49" charset="0"/>
+              </a:rPr>
+              <a:t>}</a:t>
+            </a:r>
+          </a:p>
+          <a:p>
+            <a:pPr marL="0" indent="0">
+              <a:buNone/>
+            </a:pPr>
+            <a:endParaRPr lang="fr-FR" dirty="0"/>
+          </a:p>
+        </p:txBody>
+      </p:sp>
+      <p:sp>
+        <p:nvSpPr>
+          <p:cNvPr id="6" name="Espace réservé du contenu 2">
+            <a:extLst>
+              <a:ext uri="{FF2B5EF4-FFF2-40B4-BE49-F238E27FC236}">
+                <a16:creationId xmlns:a16="http://schemas.microsoft.com/office/drawing/2014/main" id="{2D8381A0-F2FD-4288-8349-CB7791055B22}"/>
+              </a:ext>
+            </a:extLst>
+          </p:cNvPr>
+          <p:cNvSpPr txBox="1">
+            <a:spLocks/>
+          </p:cNvSpPr>
+          <p:nvPr/>
+        </p:nvSpPr>
+        <p:spPr>
+          <a:xfrm>
+            <a:off x="4765435" y="1825625"/>
+            <a:ext cx="7016262" cy="4351338"/>
+          </a:xfrm>
+          <a:prstGeom prst="rect">
+            <a:avLst/>
+          </a:prstGeom>
+        </p:spPr>
+        <p:txBody>
+          <a:bodyPr vert="horz" lIns="91440" tIns="45720" rIns="91440" bIns="45720" rtlCol="0">
+            <a:normAutofit/>
+          </a:bodyPr>
+          <a:lstStyle>
+            <a:lvl1pPr marL="228600" indent="-228600" algn="l" defTabSz="914400" rtl="0" eaLnBrk="1" latinLnBrk="0" hangingPunct="1">
+              <a:lnSpc>
+                <a:spcPct val="90000"/>
+              </a:lnSpc>
+              <a:spcBef>
+                <a:spcPts val="1000"/>
+              </a:spcBef>
+              <a:buFont typeface="Arial" panose="020B0604020202020204" pitchFamily="34" charset="0"/>
+              <a:buChar char="•"/>
+              <a:defRPr sz="2800" kern="1200">
+                <a:solidFill>
+                  <a:schemeClr val="tx1"/>
+                </a:solidFill>
+                <a:latin typeface="+mn-lt"/>
+                <a:ea typeface="+mn-ea"/>
+                <a:cs typeface="+mn-cs"/>
+              </a:defRPr>
+            </a:lvl1pPr>
+            <a:lvl2pPr marL="685800" indent="-228600" algn="l" defTabSz="914400" rtl="0" eaLnBrk="1" latinLnBrk="0" hangingPunct="1">
+              <a:lnSpc>
+                <a:spcPct val="90000"/>
+              </a:lnSpc>
+              <a:spcBef>
+                <a:spcPts val="500"/>
+              </a:spcBef>
+              <a:buFont typeface="Arial" panose="020B0604020202020204" pitchFamily="34" charset="0"/>
+              <a:buChar char="•"/>
+              <a:defRPr sz="2400" kern="1200">
+                <a:solidFill>
+                  <a:schemeClr val="tx1"/>
+                </a:solidFill>
+                <a:latin typeface="+mn-lt"/>
+                <a:ea typeface="+mn-ea"/>
+                <a:cs typeface="+mn-cs"/>
+              </a:defRPr>
+            </a:lvl2pPr>
+            <a:lvl3pPr marL="1143000" indent="-228600" algn="l" defTabSz="914400" rtl="0" eaLnBrk="1" latinLnBrk="0" hangingPunct="1">
+              <a:lnSpc>
+                <a:spcPct val="90000"/>
+              </a:lnSpc>
+              <a:spcBef>
+                <a:spcPts val="500"/>
+              </a:spcBef>
+              <a:buFont typeface="Arial" panose="020B0604020202020204" pitchFamily="34" charset="0"/>
+              <a:buChar char="•"/>
+              <a:defRPr sz="2000" kern="1200">
+                <a:solidFill>
+                  <a:schemeClr val="tx1"/>
+                </a:solidFill>
+                <a:latin typeface="+mn-lt"/>
+                <a:ea typeface="+mn-ea"/>
+                <a:cs typeface="+mn-cs"/>
+              </a:defRPr>
+            </a:lvl3pPr>
+            <a:lvl4pPr marL="1600200" indent="-228600" algn="l" defTabSz="914400" rtl="0" eaLnBrk="1" latinLnBrk="0" hangingPunct="1">
+              <a:lnSpc>
+                <a:spcPct val="90000"/>
+              </a:lnSpc>
+              <a:spcBef>
+                <a:spcPts val="500"/>
+              </a:spcBef>
+              <a:buFont typeface="Arial" panose="020B0604020202020204" pitchFamily="34" charset="0"/>
+              <a:buChar char="•"/>
+              <a:defRPr sz="1800" kern="1200">
+                <a:solidFill>
+                  <a:schemeClr val="tx1"/>
+                </a:solidFill>
+                <a:latin typeface="+mn-lt"/>
+                <a:ea typeface="+mn-ea"/>
+                <a:cs typeface="+mn-cs"/>
+              </a:defRPr>
+            </a:lvl4pPr>
+            <a:lvl5pPr marL="2057400" indent="-228600" algn="l" defTabSz="914400" rtl="0" eaLnBrk="1" latinLnBrk="0" hangingPunct="1">
+              <a:lnSpc>
+                <a:spcPct val="90000"/>
+              </a:lnSpc>
+              <a:spcBef>
+                <a:spcPts val="500"/>
+              </a:spcBef>
+              <a:buFont typeface="Arial" panose="020B0604020202020204" pitchFamily="34" charset="0"/>
+              <a:buChar char="•"/>
+              <a:defRPr sz="1800" kern="1200">
+                <a:solidFill>
+                  <a:schemeClr val="tx1"/>
+                </a:solidFill>
+                <a:latin typeface="+mn-lt"/>
+                <a:ea typeface="+mn-ea"/>
+                <a:cs typeface="+mn-cs"/>
+              </a:defRPr>
+            </a:lvl5pPr>
+            <a:lvl6pPr marL="2514600" indent="-228600" algn="l" defTabSz="914400" rtl="0" eaLnBrk="1" latinLnBrk="0" hangingPunct="1">
+              <a:lnSpc>
+                <a:spcPct val="90000"/>
+              </a:lnSpc>
+              <a:spcBef>
+                <a:spcPts val="500"/>
+              </a:spcBef>
+              <a:buFont typeface="Arial" panose="020B0604020202020204" pitchFamily="34" charset="0"/>
+              <a:buChar char="•"/>
+              <a:defRPr sz="1800" kern="1200">
+                <a:solidFill>
+                  <a:schemeClr val="tx1"/>
+                </a:solidFill>
+                <a:latin typeface="+mn-lt"/>
+                <a:ea typeface="+mn-ea"/>
+                <a:cs typeface="+mn-cs"/>
+              </a:defRPr>
+            </a:lvl6pPr>
+            <a:lvl7pPr marL="2971800" indent="-228600" algn="l" defTabSz="914400" rtl="0" eaLnBrk="1" latinLnBrk="0" hangingPunct="1">
+              <a:lnSpc>
+                <a:spcPct val="90000"/>
+              </a:lnSpc>
+              <a:spcBef>
+                <a:spcPts val="500"/>
+              </a:spcBef>
+              <a:buFont typeface="Arial" panose="020B0604020202020204" pitchFamily="34" charset="0"/>
+              <a:buChar char="•"/>
+              <a:defRPr sz="1800" kern="1200">
+                <a:solidFill>
+                  <a:schemeClr val="tx1"/>
+                </a:solidFill>
+                <a:latin typeface="+mn-lt"/>
+                <a:ea typeface="+mn-ea"/>
+                <a:cs typeface="+mn-cs"/>
+              </a:defRPr>
+            </a:lvl7pPr>
+            <a:lvl8pPr marL="3429000" indent="-228600" algn="l" defTabSz="914400" rtl="0" eaLnBrk="1" latinLnBrk="0" hangingPunct="1">
+              <a:lnSpc>
+                <a:spcPct val="90000"/>
+              </a:lnSpc>
+              <a:spcBef>
+                <a:spcPts val="500"/>
+              </a:spcBef>
+              <a:buFont typeface="Arial" panose="020B0604020202020204" pitchFamily="34" charset="0"/>
+              <a:buChar char="•"/>
+              <a:defRPr sz="1800" kern="1200">
+                <a:solidFill>
+                  <a:schemeClr val="tx1"/>
+                </a:solidFill>
+                <a:latin typeface="+mn-lt"/>
+                <a:ea typeface="+mn-ea"/>
+                <a:cs typeface="+mn-cs"/>
+              </a:defRPr>
+            </a:lvl8pPr>
+            <a:lvl9pPr marL="3886200" indent="-228600" algn="l" defTabSz="914400" rtl="0" eaLnBrk="1" latinLnBrk="0" hangingPunct="1">
+              <a:lnSpc>
+                <a:spcPct val="90000"/>
+              </a:lnSpc>
+              <a:spcBef>
+                <a:spcPts val="500"/>
+              </a:spcBef>
+              <a:buFont typeface="Arial" panose="020B0604020202020204" pitchFamily="34" charset="0"/>
+              <a:buChar char="•"/>
+              <a:defRPr sz="1800" kern="1200">
+                <a:solidFill>
+                  <a:schemeClr val="tx1"/>
+                </a:solidFill>
+                <a:latin typeface="+mn-lt"/>
+                <a:ea typeface="+mn-ea"/>
+                <a:cs typeface="+mn-cs"/>
+              </a:defRPr>
+            </a:lvl9pPr>
+          </a:lstStyle>
+          <a:p>
+            <a:pPr marL="0" indent="0">
+              <a:buNone/>
+            </a:pPr>
+            <a:r>
+              <a:rPr lang="fr-FR" dirty="0" err="1">
+                <a:solidFill>
+                  <a:srgbClr val="D73A49"/>
+                </a:solidFill>
+                <a:latin typeface="Consolas" panose="020B0609020204030204" pitchFamily="49" charset="0"/>
+              </a:rPr>
+              <a:t>int</a:t>
+            </a:r>
+            <a:r>
+              <a:rPr lang="fr-FR" dirty="0">
+                <a:solidFill>
+                  <a:srgbClr val="24292E"/>
+                </a:solidFill>
+                <a:latin typeface="Consolas" panose="020B0609020204030204" pitchFamily="49" charset="0"/>
+              </a:rPr>
+              <a:t> </a:t>
+            </a:r>
+            <a:r>
+              <a:rPr lang="fr-FR" dirty="0">
+                <a:solidFill>
+                  <a:srgbClr val="6F42C1"/>
+                </a:solidFill>
+                <a:latin typeface="Consolas" panose="020B0609020204030204" pitchFamily="49" charset="0"/>
+              </a:rPr>
+              <a:t>main</a:t>
+            </a:r>
+            <a:r>
+              <a:rPr lang="fr-FR" dirty="0">
+                <a:solidFill>
+                  <a:srgbClr val="24292E"/>
+                </a:solidFill>
+                <a:latin typeface="Consolas" panose="020B0609020204030204" pitchFamily="49" charset="0"/>
+              </a:rPr>
+              <a:t>(</a:t>
+            </a:r>
+            <a:r>
+              <a:rPr lang="fr-FR" b="0" dirty="0" err="1">
+                <a:solidFill>
+                  <a:srgbClr val="D73A49"/>
+                </a:solidFill>
+                <a:effectLst/>
+                <a:latin typeface="Consolas" panose="020B0609020204030204" pitchFamily="49" charset="0"/>
+              </a:rPr>
+              <a:t>int</a:t>
+            </a:r>
+            <a:r>
+              <a:rPr lang="fr-FR" b="0" dirty="0">
+                <a:solidFill>
+                  <a:srgbClr val="24292E"/>
+                </a:solidFill>
+                <a:effectLst/>
+                <a:latin typeface="Consolas" panose="020B0609020204030204" pitchFamily="49" charset="0"/>
+              </a:rPr>
+              <a:t> </a:t>
+            </a:r>
+            <a:r>
+              <a:rPr lang="fr-FR" b="0" dirty="0" err="1">
+                <a:solidFill>
+                  <a:srgbClr val="E36209"/>
+                </a:solidFill>
+                <a:effectLst/>
+                <a:latin typeface="Consolas" panose="020B0609020204030204" pitchFamily="49" charset="0"/>
+              </a:rPr>
+              <a:t>argc</a:t>
+            </a:r>
+            <a:r>
+              <a:rPr lang="fr-FR" b="0" dirty="0">
+                <a:solidFill>
+                  <a:srgbClr val="24292E"/>
+                </a:solidFill>
+                <a:effectLst/>
+                <a:latin typeface="Consolas" panose="020B0609020204030204" pitchFamily="49" charset="0"/>
+              </a:rPr>
+              <a:t>, </a:t>
+            </a:r>
+            <a:r>
+              <a:rPr lang="fr-FR" b="0" dirty="0">
+                <a:solidFill>
+                  <a:srgbClr val="D73A49"/>
+                </a:solidFill>
+                <a:effectLst/>
+                <a:latin typeface="Consolas" panose="020B0609020204030204" pitchFamily="49" charset="0"/>
+              </a:rPr>
+              <a:t>char</a:t>
+            </a:r>
+            <a:r>
+              <a:rPr lang="fr-FR" b="0" dirty="0">
+                <a:solidFill>
+                  <a:srgbClr val="24292E"/>
+                </a:solidFill>
+                <a:effectLst/>
+                <a:latin typeface="Consolas" panose="020B0609020204030204" pitchFamily="49" charset="0"/>
+              </a:rPr>
+              <a:t> </a:t>
+            </a:r>
+            <a:r>
+              <a:rPr lang="fr-FR" b="0" dirty="0">
+                <a:solidFill>
+                  <a:srgbClr val="D73A49"/>
+                </a:solidFill>
+                <a:effectLst/>
+                <a:latin typeface="Consolas" panose="020B0609020204030204" pitchFamily="49" charset="0"/>
+              </a:rPr>
+              <a:t>**</a:t>
+            </a:r>
+            <a:r>
+              <a:rPr lang="fr-FR" b="0" dirty="0">
+                <a:solidFill>
+                  <a:srgbClr val="24292E"/>
+                </a:solidFill>
+                <a:effectLst/>
+                <a:latin typeface="Consolas" panose="020B0609020204030204" pitchFamily="49" charset="0"/>
+              </a:rPr>
+              <a:t> </a:t>
+            </a:r>
+            <a:r>
+              <a:rPr lang="fr-FR" b="0" dirty="0" err="1">
+                <a:solidFill>
+                  <a:srgbClr val="E36209"/>
+                </a:solidFill>
+                <a:effectLst/>
+                <a:latin typeface="Consolas" panose="020B0609020204030204" pitchFamily="49" charset="0"/>
+              </a:rPr>
+              <a:t>argv</a:t>
+            </a:r>
+            <a:r>
+              <a:rPr lang="fr-FR" dirty="0">
+                <a:solidFill>
+                  <a:srgbClr val="24292E"/>
+                </a:solidFill>
+                <a:latin typeface="Consolas" panose="020B0609020204030204" pitchFamily="49" charset="0"/>
+              </a:rPr>
+              <a:t>) {</a:t>
+            </a:r>
+          </a:p>
+          <a:p>
+            <a:pPr marL="0" indent="0">
+              <a:buFont typeface="Arial" panose="020B0604020202020204" pitchFamily="34" charset="0"/>
+              <a:buNone/>
+            </a:pPr>
+            <a:r>
+              <a:rPr lang="fr-FR" dirty="0">
+                <a:solidFill>
+                  <a:srgbClr val="24292E"/>
+                </a:solidFill>
+                <a:latin typeface="Consolas" panose="020B0609020204030204" pitchFamily="49" charset="0"/>
+              </a:rPr>
+              <a:t>	...</a:t>
+            </a:r>
+          </a:p>
+          <a:p>
+            <a:pPr marL="0" indent="0">
+              <a:buFont typeface="Arial" panose="020B0604020202020204" pitchFamily="34" charset="0"/>
+              <a:buNone/>
+            </a:pPr>
+            <a:r>
+              <a:rPr lang="fr-FR" dirty="0">
+                <a:solidFill>
+                  <a:srgbClr val="24292E"/>
+                </a:solidFill>
+                <a:latin typeface="Consolas" panose="020B0609020204030204" pitchFamily="49" charset="0"/>
+              </a:rPr>
+              <a:t>}</a:t>
+            </a:r>
+          </a:p>
+          <a:p>
+            <a:pPr marL="0" indent="0">
+              <a:buFont typeface="Arial" panose="020B0604020202020204" pitchFamily="34" charset="0"/>
+              <a:buNone/>
+            </a:pPr>
+            <a:endParaRPr lang="fr-FR" dirty="0"/>
+          </a:p>
+        </p:txBody>
+      </p:sp>
+      <p:sp>
+        <p:nvSpPr>
+          <p:cNvPr id="7" name="Flèche : droite 6">
+            <a:extLst>
+              <a:ext uri="{FF2B5EF4-FFF2-40B4-BE49-F238E27FC236}">
+                <a16:creationId xmlns:a16="http://schemas.microsoft.com/office/drawing/2014/main" id="{2B3AA63B-2434-4060-AE49-DF69E4696E2F}"/>
+              </a:ext>
+            </a:extLst>
+          </p:cNvPr>
+          <p:cNvSpPr/>
+          <p:nvPr/>
+        </p:nvSpPr>
+        <p:spPr>
+          <a:xfrm>
+            <a:off x="3669325" y="2074985"/>
+            <a:ext cx="937846" cy="1354015"/>
+          </a:xfrm>
+          <a:prstGeom prst="rightArrow">
+            <a:avLst/>
+          </a:prstGeom>
+        </p:spPr>
+        <p:style>
+          <a:lnRef idx="2">
+            <a:schemeClr val="accent1">
+              <a:shade val="50000"/>
+            </a:schemeClr>
+          </a:lnRef>
+          <a:fillRef idx="1">
+            <a:schemeClr val="accent1"/>
+          </a:fillRef>
+          <a:effectRef idx="0">
+            <a:schemeClr val="accent1"/>
+          </a:effectRef>
+          <a:fontRef idx="minor">
+            <a:schemeClr val="lt1"/>
+          </a:fontRef>
+        </p:style>
+        <p:txBody>
+          <a:bodyPr rtlCol="0" anchor="ctr"/>
+          <a:lstStyle/>
+          <a:p>
+            <a:pPr algn="ctr"/>
+            <a:endParaRPr lang="fr-FR"/>
+          </a:p>
+        </p:txBody>
+      </p:sp>
+      <p:graphicFrame>
+        <p:nvGraphicFramePr>
+          <p:cNvPr id="8" name="Tableau 8">
+            <a:extLst>
+              <a:ext uri="{FF2B5EF4-FFF2-40B4-BE49-F238E27FC236}">
+                <a16:creationId xmlns:a16="http://schemas.microsoft.com/office/drawing/2014/main" id="{BA7DC314-9196-4E9E-A938-00C3BC5BCE9B}"/>
+              </a:ext>
+            </a:extLst>
+          </p:cNvPr>
+          <p:cNvGraphicFramePr>
+            <a:graphicFrameLocks noGrp="1"/>
+          </p:cNvGraphicFramePr>
+          <p:nvPr>
+            <p:extLst>
+              <p:ext uri="{D42A27DB-BD31-4B8C-83A1-F6EECF244321}">
+                <p14:modId xmlns:p14="http://schemas.microsoft.com/office/powerpoint/2010/main" val="1666904189"/>
+              </p:ext>
+            </p:extLst>
+          </p:nvPr>
+        </p:nvGraphicFramePr>
+        <p:xfrm>
+          <a:off x="1524000" y="4051835"/>
+          <a:ext cx="9929446" cy="2319120"/>
+        </p:xfrm>
+        <a:graphic>
+          <a:graphicData uri="http://schemas.openxmlformats.org/drawingml/2006/table">
+            <a:tbl>
+              <a:tblPr firstRow="1" bandRow="1">
+                <a:tableStyleId>{5940675A-B579-460E-94D1-54222C63F5DA}</a:tableStyleId>
+              </a:tblPr>
+              <a:tblGrid>
+                <a:gridCol w="3578884">
+                  <a:extLst>
+                    <a:ext uri="{9D8B030D-6E8A-4147-A177-3AD203B41FA5}">
+                      <a16:colId xmlns:a16="http://schemas.microsoft.com/office/drawing/2014/main" val="3814583350"/>
+                    </a:ext>
+                  </a:extLst>
+                </a:gridCol>
+                <a:gridCol w="6350562">
+                  <a:extLst>
+                    <a:ext uri="{9D8B030D-6E8A-4147-A177-3AD203B41FA5}">
+                      <a16:colId xmlns:a16="http://schemas.microsoft.com/office/drawing/2014/main" val="831902538"/>
+                    </a:ext>
+                  </a:extLst>
+                </a:gridCol>
+              </a:tblGrid>
+              <a:tr h="699297">
+                <a:tc>
+                  <a:txBody>
+                    <a:bodyPr/>
+                    <a:lstStyle/>
+                    <a:p>
+                      <a:pPr algn="ctr"/>
+                      <a:r>
+                        <a:rPr lang="fr-FR" sz="2800" b="0" dirty="0" err="1">
+                          <a:solidFill>
+                            <a:srgbClr val="D73A49"/>
+                          </a:solidFill>
+                          <a:effectLst/>
+                          <a:latin typeface="Consolas" panose="020B0609020204030204" pitchFamily="49" charset="0"/>
+                        </a:rPr>
+                        <a:t>int</a:t>
+                      </a:r>
+                      <a:r>
+                        <a:rPr lang="fr-FR" sz="2800" b="0" dirty="0">
+                          <a:solidFill>
+                            <a:srgbClr val="24292E"/>
+                          </a:solidFill>
+                          <a:effectLst/>
+                          <a:latin typeface="Consolas" panose="020B0609020204030204" pitchFamily="49" charset="0"/>
+                        </a:rPr>
+                        <a:t> </a:t>
+                      </a:r>
+                      <a:r>
+                        <a:rPr lang="fr-FR" sz="2800" b="0" dirty="0" err="1">
+                          <a:solidFill>
+                            <a:srgbClr val="E36209"/>
+                          </a:solidFill>
+                          <a:effectLst/>
+                          <a:latin typeface="Consolas" panose="020B0609020204030204" pitchFamily="49" charset="0"/>
+                        </a:rPr>
+                        <a:t>argc</a:t>
+                      </a:r>
+                      <a:endParaRPr lang="fr-FR" sz="2800" b="0" dirty="0">
+                        <a:solidFill>
+                          <a:srgbClr val="E36209"/>
+                        </a:solidFill>
+                        <a:effectLst/>
+                        <a:latin typeface="Consolas" panose="020B0609020204030204" pitchFamily="49" charset="0"/>
+                      </a:endParaRPr>
+                    </a:p>
+                    <a:p>
+                      <a:pPr algn="ctr"/>
+                      <a:r>
+                        <a:rPr lang="fr-FR" sz="2000" b="0" dirty="0">
+                          <a:solidFill>
+                            <a:schemeClr val="tx1"/>
+                          </a:solidFill>
+                          <a:effectLst/>
+                        </a:rPr>
+                        <a:t>(count)</a:t>
+                      </a:r>
+                      <a:endParaRPr lang="fr-FR" sz="2000" dirty="0">
+                        <a:solidFill>
+                          <a:schemeClr val="tx1"/>
+                        </a:solidFill>
+                      </a:endParaRPr>
+                    </a:p>
+                  </a:txBody>
+                  <a:tcPr marT="72000" marB="144000" anchor="ctr"/>
+                </a:tc>
+                <a:tc>
+                  <a:txBody>
+                    <a:bodyPr/>
+                    <a:lstStyle/>
+                    <a:p>
+                      <a:pPr algn="ctr"/>
+                      <a:r>
+                        <a:rPr lang="fr-FR" sz="2800" b="0" dirty="0">
+                          <a:solidFill>
+                            <a:srgbClr val="D73A49"/>
+                          </a:solidFill>
+                          <a:effectLst/>
+                          <a:latin typeface="Consolas" panose="020B0609020204030204" pitchFamily="49" charset="0"/>
+                        </a:rPr>
+                        <a:t>char</a:t>
+                      </a:r>
+                      <a:r>
+                        <a:rPr lang="fr-FR" sz="2800" b="0" dirty="0">
+                          <a:solidFill>
+                            <a:srgbClr val="24292E"/>
+                          </a:solidFill>
+                          <a:effectLst/>
+                          <a:latin typeface="Consolas" panose="020B0609020204030204" pitchFamily="49" charset="0"/>
+                        </a:rPr>
+                        <a:t> </a:t>
+                      </a:r>
+                      <a:r>
+                        <a:rPr lang="fr-FR" sz="2800" b="0" dirty="0">
+                          <a:solidFill>
+                            <a:srgbClr val="D73A49"/>
+                          </a:solidFill>
+                          <a:effectLst/>
+                          <a:latin typeface="Consolas" panose="020B0609020204030204" pitchFamily="49" charset="0"/>
+                        </a:rPr>
+                        <a:t>**</a:t>
+                      </a:r>
+                      <a:r>
+                        <a:rPr lang="fr-FR" sz="2800" b="0" dirty="0">
+                          <a:solidFill>
+                            <a:srgbClr val="24292E"/>
+                          </a:solidFill>
+                          <a:effectLst/>
+                          <a:latin typeface="Consolas" panose="020B0609020204030204" pitchFamily="49" charset="0"/>
+                        </a:rPr>
+                        <a:t> </a:t>
+                      </a:r>
+                      <a:r>
+                        <a:rPr lang="fr-FR" sz="2800" b="0" dirty="0" err="1">
+                          <a:solidFill>
+                            <a:srgbClr val="E36209"/>
+                          </a:solidFill>
+                          <a:effectLst/>
+                          <a:latin typeface="Consolas" panose="020B0609020204030204" pitchFamily="49" charset="0"/>
+                        </a:rPr>
+                        <a:t>argv</a:t>
+                      </a:r>
+                      <a:r>
+                        <a:rPr lang="fr-FR" sz="2800" b="0" dirty="0">
+                          <a:solidFill>
+                            <a:srgbClr val="E36209"/>
+                          </a:solidFill>
+                          <a:effectLst/>
+                          <a:latin typeface="+mn-lt"/>
+                        </a:rPr>
+                        <a:t> </a:t>
+                      </a:r>
+                      <a:r>
+                        <a:rPr lang="fr-FR" sz="2800" b="0" dirty="0">
+                          <a:solidFill>
+                            <a:schemeClr val="tx1"/>
+                          </a:solidFill>
+                          <a:effectLst/>
+                          <a:latin typeface="+mn-lt"/>
+                        </a:rPr>
+                        <a:t>ou</a:t>
+                      </a:r>
+                      <a:r>
+                        <a:rPr lang="fr-FR" sz="2800" b="0" dirty="0">
+                          <a:solidFill>
+                            <a:srgbClr val="E36209"/>
+                          </a:solidFill>
+                          <a:effectLst/>
+                          <a:latin typeface="+mn-lt"/>
+                        </a:rPr>
+                        <a:t> </a:t>
+                      </a:r>
+                      <a:r>
+                        <a:rPr lang="fr-FR" sz="2800" b="0" dirty="0">
+                          <a:solidFill>
+                            <a:srgbClr val="D73A49"/>
+                          </a:solidFill>
+                          <a:effectLst/>
+                          <a:latin typeface="Consolas" panose="020B0609020204030204" pitchFamily="49" charset="0"/>
+                        </a:rPr>
+                        <a:t>char</a:t>
+                      </a:r>
+                      <a:r>
+                        <a:rPr lang="fr-FR" sz="2800" b="0" dirty="0">
+                          <a:solidFill>
+                            <a:srgbClr val="24292E"/>
+                          </a:solidFill>
+                          <a:effectLst/>
+                          <a:latin typeface="Consolas" panose="020B0609020204030204" pitchFamily="49" charset="0"/>
+                        </a:rPr>
+                        <a:t> </a:t>
+                      </a:r>
+                      <a:r>
+                        <a:rPr lang="fr-FR" sz="2800" b="0" dirty="0">
+                          <a:solidFill>
+                            <a:srgbClr val="D73A49"/>
+                          </a:solidFill>
+                          <a:effectLst/>
+                          <a:latin typeface="Consolas" panose="020B0609020204030204" pitchFamily="49" charset="0"/>
+                        </a:rPr>
+                        <a:t>*</a:t>
+                      </a:r>
+                      <a:r>
+                        <a:rPr lang="fr-FR" sz="2800" b="0" dirty="0">
+                          <a:solidFill>
+                            <a:srgbClr val="24292E"/>
+                          </a:solidFill>
+                          <a:effectLst/>
+                          <a:latin typeface="Consolas" panose="020B0609020204030204" pitchFamily="49" charset="0"/>
+                        </a:rPr>
+                        <a:t> </a:t>
+                      </a:r>
+                      <a:r>
+                        <a:rPr lang="fr-FR" sz="2800" b="0" dirty="0" err="1">
+                          <a:solidFill>
+                            <a:srgbClr val="E36209"/>
+                          </a:solidFill>
+                          <a:effectLst/>
+                          <a:latin typeface="Consolas" panose="020B0609020204030204" pitchFamily="49" charset="0"/>
+                        </a:rPr>
+                        <a:t>argv</a:t>
+                      </a:r>
+                      <a:r>
+                        <a:rPr lang="fr-FR" sz="2800" b="0" dirty="0">
+                          <a:solidFill>
+                            <a:srgbClr val="D73A49"/>
+                          </a:solidFill>
+                          <a:effectLst/>
+                          <a:latin typeface="Consolas" panose="020B0609020204030204" pitchFamily="49" charset="0"/>
+                        </a:rPr>
+                        <a:t>[]</a:t>
+                      </a:r>
+                    </a:p>
+                    <a:p>
+                      <a:pPr marL="0" algn="ctr" defTabSz="914400" rtl="0" eaLnBrk="1" latinLnBrk="0" hangingPunct="1"/>
+                      <a:r>
+                        <a:rPr lang="fr-FR" sz="2000" b="0" kern="1200" dirty="0">
+                          <a:solidFill>
+                            <a:schemeClr val="tx1"/>
+                          </a:solidFill>
+                          <a:effectLst/>
+                          <a:latin typeface="+mn-lt"/>
+                          <a:ea typeface="+mn-ea"/>
+                          <a:cs typeface="+mn-cs"/>
+                        </a:rPr>
+                        <a:t>(values)</a:t>
+                      </a:r>
+                    </a:p>
+                  </a:txBody>
+                  <a:tcPr marT="72000" marB="144000" anchor="ctr"/>
+                </a:tc>
+                <a:extLst>
+                  <a:ext uri="{0D108BD9-81ED-4DB2-BD59-A6C34878D82A}">
+                    <a16:rowId xmlns:a16="http://schemas.microsoft.com/office/drawing/2014/main" val="1577128220"/>
+                  </a:ext>
+                </a:extLst>
+              </a:tr>
+              <a:tr h="1207006">
+                <a:tc>
+                  <a:txBody>
+                    <a:bodyPr/>
+                    <a:lstStyle/>
+                    <a:p>
+                      <a:pPr algn="ctr"/>
+                      <a:r>
+                        <a:rPr lang="fr-FR" sz="2800" dirty="0"/>
+                        <a:t>Le nombre d’arguments passés au programme</a:t>
+                      </a:r>
+                    </a:p>
+                  </a:txBody>
+                  <a:tcPr/>
+                </a:tc>
+                <a:tc>
+                  <a:txBody>
+                    <a:bodyPr/>
+                    <a:lstStyle/>
+                    <a:p>
+                      <a:pPr algn="ctr"/>
+                      <a:r>
+                        <a:rPr lang="fr-FR" sz="2800" dirty="0"/>
+                        <a:t>La liste des chaînes de caractères de la ligne de commande</a:t>
+                      </a:r>
+                    </a:p>
+                  </a:txBody>
+                  <a:tcPr/>
+                </a:tc>
+                <a:extLst>
+                  <a:ext uri="{0D108BD9-81ED-4DB2-BD59-A6C34878D82A}">
+                    <a16:rowId xmlns:a16="http://schemas.microsoft.com/office/drawing/2014/main" val="949101467"/>
+                  </a:ext>
+                </a:extLst>
+              </a:tr>
+            </a:tbl>
+          </a:graphicData>
+        </a:graphic>
+      </p:graphicFrame>
+    </p:spTree>
+    <p:extLst>
+      <p:ext uri="{BB962C8B-B14F-4D97-AF65-F5344CB8AC3E}">
+        <p14:creationId xmlns:p14="http://schemas.microsoft.com/office/powerpoint/2010/main" val="1197819170"/>
+      </p:ext>
+    </p:extLst>
+  </p:cSld>
+  <p:clrMapOvr>
+    <a:masterClrMapping/>
+  </p:clrMapOvr>
+  <p:timing>
+    <p:tnLst>
+      <p:par>
+        <p:cTn id="1" dur="indefinite" restart="never" nodeType="tmRoot">
+          <p:childTnLst>
+            <p:seq concurrent="1" nextAc="seek">
+              <p:cTn id="2" dur="indefinite" nodeType="mainSeq">
+                <p:childTnLst>
+                  <p:par>
+                    <p:cTn id="3" fill="hold">
+                      <p:stCondLst>
+                        <p:cond delay="indefinite"/>
+                      </p:stCondLst>
+                      <p:childTnLst>
+                        <p:par>
+                          <p:cTn id="4" fill="hold">
+                            <p:stCondLst>
+                              <p:cond delay="0"/>
+                            </p:stCondLst>
+                            <p:childTnLst>
+                              <p:par>
+                                <p:cTn id="5" presetID="2" presetClass="entr" presetSubtype="8" fill="hold" grpId="0" nodeType="clickEffect">
+                                  <p:stCondLst>
+                                    <p:cond delay="0"/>
+                                  </p:stCondLst>
+                                  <p:childTnLst>
+                                    <p:set>
+                                      <p:cBhvr>
+                                        <p:cTn id="6" dur="1" fill="hold">
+                                          <p:stCondLst>
+                                            <p:cond delay="0"/>
+                                          </p:stCondLst>
+                                        </p:cTn>
+                                        <p:tgtEl>
+                                          <p:spTgt spid="7"/>
+                                        </p:tgtEl>
+                                        <p:attrNameLst>
+                                          <p:attrName>style.visibility</p:attrName>
+                                        </p:attrNameLst>
+                                      </p:cBhvr>
+                                      <p:to>
+                                        <p:strVal val="visible"/>
+                                      </p:to>
+                                    </p:set>
+                                    <p:anim calcmode="lin" valueType="num">
+                                      <p:cBhvr additive="base">
+                                        <p:cTn id="7" dur="500" fill="hold"/>
+                                        <p:tgtEl>
+                                          <p:spTgt spid="7"/>
+                                        </p:tgtEl>
+                                        <p:attrNameLst>
+                                          <p:attrName>ppt_x</p:attrName>
+                                        </p:attrNameLst>
+                                      </p:cBhvr>
+                                      <p:tavLst>
+                                        <p:tav tm="0">
+                                          <p:val>
+                                            <p:strVal val="0-#ppt_w/2"/>
+                                          </p:val>
+                                        </p:tav>
+                                        <p:tav tm="100000">
+                                          <p:val>
+                                            <p:strVal val="#ppt_x"/>
+                                          </p:val>
+                                        </p:tav>
+                                      </p:tavLst>
+                                    </p:anim>
+                                    <p:anim calcmode="lin" valueType="num">
+                                      <p:cBhvr additive="base">
+                                        <p:cTn id="8" dur="500" fill="hold"/>
+                                        <p:tgtEl>
+                                          <p:spTgt spid="7"/>
+                                        </p:tgtEl>
+                                        <p:attrNameLst>
+                                          <p:attrName>ppt_y</p:attrName>
+                                        </p:attrNameLst>
+                                      </p:cBhvr>
+                                      <p:tavLst>
+                                        <p:tav tm="0">
+                                          <p:val>
+                                            <p:strVal val="#ppt_y"/>
+                                          </p:val>
+                                        </p:tav>
+                                        <p:tav tm="100000">
+                                          <p:val>
+                                            <p:strVal val="#ppt_y"/>
+                                          </p:val>
+                                        </p:tav>
+                                      </p:tavLst>
+                                    </p:anim>
+                                  </p:childTnLst>
+                                </p:cTn>
+                              </p:par>
+                              <p:par>
+                                <p:cTn id="9" presetID="2" presetClass="entr" presetSubtype="2" fill="hold" grpId="0" nodeType="withEffect">
+                                  <p:stCondLst>
+                                    <p:cond delay="0"/>
+                                  </p:stCondLst>
+                                  <p:childTnLst>
+                                    <p:set>
+                                      <p:cBhvr>
+                                        <p:cTn id="10" dur="1" fill="hold">
+                                          <p:stCondLst>
+                                            <p:cond delay="0"/>
+                                          </p:stCondLst>
+                                        </p:cTn>
+                                        <p:tgtEl>
+                                          <p:spTgt spid="6"/>
+                                        </p:tgtEl>
+                                        <p:attrNameLst>
+                                          <p:attrName>style.visibility</p:attrName>
+                                        </p:attrNameLst>
+                                      </p:cBhvr>
+                                      <p:to>
+                                        <p:strVal val="visible"/>
+                                      </p:to>
+                                    </p:set>
+                                    <p:anim calcmode="lin" valueType="num">
+                                      <p:cBhvr additive="base">
+                                        <p:cTn id="11" dur="500" fill="hold"/>
+                                        <p:tgtEl>
+                                          <p:spTgt spid="6"/>
+                                        </p:tgtEl>
+                                        <p:attrNameLst>
+                                          <p:attrName>ppt_x</p:attrName>
+                                        </p:attrNameLst>
+                                      </p:cBhvr>
+                                      <p:tavLst>
+                                        <p:tav tm="0">
+                                          <p:val>
+                                            <p:strVal val="1+#ppt_w/2"/>
+                                          </p:val>
+                                        </p:tav>
+                                        <p:tav tm="100000">
+                                          <p:val>
+                                            <p:strVal val="#ppt_x"/>
+                                          </p:val>
+                                        </p:tav>
+                                      </p:tavLst>
+                                    </p:anim>
+                                    <p:anim calcmode="lin" valueType="num">
+                                      <p:cBhvr additive="base">
+                                        <p:cTn id="12" dur="500" fill="hold"/>
+                                        <p:tgtEl>
+                                          <p:spTgt spid="6"/>
+                                        </p:tgtEl>
+                                        <p:attrNameLst>
+                                          <p:attrName>ppt_y</p:attrName>
+                                        </p:attrNameLst>
+                                      </p:cBhvr>
+                                      <p:tavLst>
+                                        <p:tav tm="0">
+                                          <p:val>
+                                            <p:strVal val="#ppt_y"/>
+                                          </p:val>
+                                        </p:tav>
+                                        <p:tav tm="100000">
+                                          <p:val>
+                                            <p:strVal val="#ppt_y"/>
+                                          </p:val>
+                                        </p:tav>
+                                      </p:tavLst>
+                                    </p:anim>
+                                  </p:childTnLst>
+                                </p:cTn>
+                              </p:par>
+                            </p:childTnLst>
+                          </p:cTn>
+                        </p:par>
+                      </p:childTnLst>
+                    </p:cTn>
+                  </p:par>
+                  <p:par>
+                    <p:cTn id="13" fill="hold">
+                      <p:stCondLst>
+                        <p:cond delay="indefinite"/>
+                      </p:stCondLst>
+                      <p:childTnLst>
+                        <p:par>
+                          <p:cTn id="14" fill="hold">
+                            <p:stCondLst>
+                              <p:cond delay="0"/>
+                            </p:stCondLst>
+                            <p:childTnLst>
+                              <p:par>
+                                <p:cTn id="15" presetID="2" presetClass="entr" presetSubtype="4" fill="hold" nodeType="clickEffect">
+                                  <p:stCondLst>
+                                    <p:cond delay="0"/>
+                                  </p:stCondLst>
+                                  <p:childTnLst>
+                                    <p:set>
+                                      <p:cBhvr>
+                                        <p:cTn id="16" dur="1" fill="hold">
+                                          <p:stCondLst>
+                                            <p:cond delay="0"/>
+                                          </p:stCondLst>
+                                        </p:cTn>
+                                        <p:tgtEl>
+                                          <p:spTgt spid="8"/>
+                                        </p:tgtEl>
+                                        <p:attrNameLst>
+                                          <p:attrName>style.visibility</p:attrName>
+                                        </p:attrNameLst>
+                                      </p:cBhvr>
+                                      <p:to>
+                                        <p:strVal val="visible"/>
+                                      </p:to>
+                                    </p:set>
+                                    <p:anim calcmode="lin" valueType="num">
+                                      <p:cBhvr additive="base">
+                                        <p:cTn id="17" dur="500" fill="hold"/>
+                                        <p:tgtEl>
+                                          <p:spTgt spid="8"/>
+                                        </p:tgtEl>
+                                        <p:attrNameLst>
+                                          <p:attrName>ppt_x</p:attrName>
+                                        </p:attrNameLst>
+                                      </p:cBhvr>
+                                      <p:tavLst>
+                                        <p:tav tm="0">
+                                          <p:val>
+                                            <p:strVal val="#ppt_x"/>
+                                          </p:val>
+                                        </p:tav>
+                                        <p:tav tm="100000">
+                                          <p:val>
+                                            <p:strVal val="#ppt_x"/>
+                                          </p:val>
+                                        </p:tav>
+                                      </p:tavLst>
+                                    </p:anim>
+                                    <p:anim calcmode="lin" valueType="num">
+                                      <p:cBhvr additive="base">
+                                        <p:cTn id="18" dur="500" fill="hold"/>
+                                        <p:tgtEl>
+                                          <p:spTgt spid="8"/>
+                                        </p:tgtEl>
+                                        <p:attrNameLst>
+                                          <p:attrName>ppt_y</p:attrName>
+                                        </p:attrNameLst>
+                                      </p:cBhvr>
+                                      <p:tavLst>
+                                        <p:tav tm="0">
+                                          <p:val>
+                                            <p:strVal val="1+#ppt_h/2"/>
+                                          </p:val>
+                                        </p:tav>
+                                        <p:tav tm="100000">
+                                          <p:val>
+                                            <p:strVal val="#ppt_y"/>
+                                          </p:val>
+                                        </p:tav>
+                                      </p:tavLst>
+                                    </p:anim>
+                                  </p:childTnLst>
+                                </p:cTn>
+                              </p:par>
+                            </p:childTnLst>
+                          </p:cTn>
+                        </p:par>
+                      </p:childTnLst>
+                    </p:cTn>
+                  </p:par>
+                </p:childTnLst>
+              </p:cTn>
+              <p:prevCondLst>
+                <p:cond evt="onPrev" delay="0">
+                  <p:tgtEl>
+                    <p:sldTgt/>
+                  </p:tgtEl>
+                </p:cond>
+              </p:prevCondLst>
+              <p:nextCondLst>
+                <p:cond evt="onNext" delay="0">
+                  <p:tgtEl>
+                    <p:sldTgt/>
+                  </p:tgtEl>
+                </p:cond>
+              </p:nextCondLst>
+            </p:seq>
+          </p:childTnLst>
+        </p:cTn>
+      </p:par>
+    </p:tnLst>
+    <p:bldLst>
+      <p:bldP spid="6" grpId="0"/>
+      <p:bldP spid="7" grpId="0" animBg="1"/>
+    </p:bldLst>
+  </p:timing>
+</p:sld>
+</file>
+
+<file path=ppt/slides/slide22.xml><?xml version="1.0" encoding="utf-8"?>
+<p:sld xmlns:a="http://schemas.openxmlformats.org/drawingml/2006/main" xmlns:r="http://schemas.openxmlformats.org/officeDocument/2006/relationships" xmlns:p="http://schemas.openxmlformats.org/presentationml/2006/main">
+  <p:cSld>
+    <p:spTree>
+      <p:nvGrpSpPr>
+        <p:cNvPr id="1" name=""/>
+        <p:cNvGrpSpPr/>
+        <p:nvPr/>
+      </p:nvGrpSpPr>
+      <p:grpSpPr>
+        <a:xfrm>
+          <a:off x="0" y="0"/>
+          <a:ext cx="0" cy="0"/>
+          <a:chOff x="0" y="0"/>
+          <a:chExt cx="0" cy="0"/>
+        </a:xfrm>
+      </p:grpSpPr>
+      <p:sp>
+        <p:nvSpPr>
+          <p:cNvPr id="2" name="Titre 1">
+            <a:extLst>
+              <a:ext uri="{FF2B5EF4-FFF2-40B4-BE49-F238E27FC236}">
+                <a16:creationId xmlns:a16="http://schemas.microsoft.com/office/drawing/2014/main" id="{92548FC0-6A9B-43E8-912D-D8D0885FE4B8}"/>
+              </a:ext>
+            </a:extLst>
+          </p:cNvPr>
+          <p:cNvSpPr>
+            <a:spLocks noGrp="1"/>
+          </p:cNvSpPr>
+          <p:nvPr>
+            <p:ph type="title"/>
+          </p:nvPr>
+        </p:nvSpPr>
+        <p:spPr/>
+        <p:txBody>
+          <a:bodyPr/>
+          <a:lstStyle/>
+          <a:p>
+            <a:r>
+              <a:rPr lang="fr-FR" dirty="0"/>
+              <a:t>Exemple</a:t>
+            </a:r>
+          </a:p>
+        </p:txBody>
+      </p:sp>
+      <p:sp>
+        <p:nvSpPr>
+          <p:cNvPr id="3" name="Espace réservé du contenu 2">
+            <a:extLst>
+              <a:ext uri="{FF2B5EF4-FFF2-40B4-BE49-F238E27FC236}">
+                <a16:creationId xmlns:a16="http://schemas.microsoft.com/office/drawing/2014/main" id="{5C11F8A2-8495-4395-BD3F-02B7AD137630}"/>
+              </a:ext>
+            </a:extLst>
+          </p:cNvPr>
+          <p:cNvSpPr>
+            <a:spLocks noGrp="1"/>
+          </p:cNvSpPr>
+          <p:nvPr>
+            <p:ph idx="1"/>
+          </p:nvPr>
+        </p:nvSpPr>
+        <p:spPr>
+          <a:xfrm>
+            <a:off x="838200" y="1512277"/>
+            <a:ext cx="10515600" cy="4664686"/>
+          </a:xfrm>
+        </p:spPr>
+        <p:txBody>
+          <a:bodyPr>
+            <a:normAutofit/>
+          </a:bodyPr>
+          <a:lstStyle/>
+          <a:p>
+            <a:pPr marL="0" indent="0">
+              <a:buNone/>
+            </a:pPr>
+            <a:r>
+              <a:rPr lang="fr-FR" sz="2400" b="0" dirty="0">
+                <a:solidFill>
+                  <a:srgbClr val="D73A49"/>
+                </a:solidFill>
+                <a:effectLst/>
+                <a:latin typeface="Consolas" panose="020B0609020204030204" pitchFamily="49" charset="0"/>
+              </a:rPr>
+              <a:t>#include</a:t>
+            </a:r>
+            <a:r>
+              <a:rPr lang="fr-FR" sz="2400" b="0" dirty="0">
+                <a:solidFill>
+                  <a:srgbClr val="24292E"/>
+                </a:solidFill>
+                <a:effectLst/>
+                <a:latin typeface="Consolas" panose="020B0609020204030204" pitchFamily="49" charset="0"/>
+              </a:rPr>
+              <a:t> </a:t>
+            </a:r>
+            <a:r>
+              <a:rPr lang="fr-FR" sz="2400" b="0" dirty="0">
+                <a:solidFill>
+                  <a:srgbClr val="032F62"/>
+                </a:solidFill>
+                <a:effectLst/>
+                <a:latin typeface="Consolas" panose="020B0609020204030204" pitchFamily="49" charset="0"/>
+              </a:rPr>
+              <a:t>&lt;</a:t>
+            </a:r>
+            <a:r>
+              <a:rPr lang="fr-FR" sz="2400" b="0" dirty="0" err="1">
+                <a:solidFill>
+                  <a:srgbClr val="032F62"/>
+                </a:solidFill>
+                <a:effectLst/>
+                <a:latin typeface="Consolas" panose="020B0609020204030204" pitchFamily="49" charset="0"/>
+              </a:rPr>
+              <a:t>stdio.h</a:t>
+            </a:r>
+            <a:r>
+              <a:rPr lang="fr-FR" sz="2400" b="0" dirty="0">
+                <a:solidFill>
+                  <a:srgbClr val="032F62"/>
+                </a:solidFill>
+                <a:effectLst/>
+                <a:latin typeface="Consolas" panose="020B0609020204030204" pitchFamily="49" charset="0"/>
+              </a:rPr>
+              <a:t>&gt;</a:t>
+            </a:r>
+            <a:endParaRPr lang="fr-FR" sz="2400" b="0" dirty="0">
+              <a:solidFill>
+                <a:srgbClr val="24292E"/>
+              </a:solidFill>
+              <a:effectLst/>
+              <a:latin typeface="Consolas" panose="020B0609020204030204" pitchFamily="49" charset="0"/>
+            </a:endParaRPr>
+          </a:p>
+          <a:p>
+            <a:pPr marL="0" indent="0">
+              <a:buNone/>
+            </a:pPr>
+            <a:br>
+              <a:rPr lang="fr-FR" sz="2400" b="0" dirty="0">
+                <a:solidFill>
+                  <a:srgbClr val="24292E"/>
+                </a:solidFill>
+                <a:effectLst/>
+                <a:latin typeface="Consolas" panose="020B0609020204030204" pitchFamily="49" charset="0"/>
+              </a:rPr>
+            </a:br>
+            <a:r>
+              <a:rPr lang="fr-FR" sz="2400" b="0" dirty="0" err="1">
+                <a:solidFill>
+                  <a:srgbClr val="D73A49"/>
+                </a:solidFill>
+                <a:effectLst/>
+                <a:latin typeface="Consolas" panose="020B0609020204030204" pitchFamily="49" charset="0"/>
+              </a:rPr>
+              <a:t>int</a:t>
+            </a:r>
+            <a:r>
+              <a:rPr lang="fr-FR" sz="2400" b="0" dirty="0">
+                <a:solidFill>
+                  <a:srgbClr val="24292E"/>
+                </a:solidFill>
+                <a:effectLst/>
+                <a:latin typeface="Consolas" panose="020B0609020204030204" pitchFamily="49" charset="0"/>
+              </a:rPr>
+              <a:t> </a:t>
+            </a:r>
+            <a:r>
+              <a:rPr lang="fr-FR" sz="2400" b="0" dirty="0">
+                <a:solidFill>
+                  <a:srgbClr val="6F42C1"/>
+                </a:solidFill>
+                <a:effectLst/>
+                <a:latin typeface="Consolas" panose="020B0609020204030204" pitchFamily="49" charset="0"/>
+              </a:rPr>
+              <a:t>main</a:t>
+            </a:r>
+            <a:r>
+              <a:rPr lang="fr-FR" sz="2400" b="0" dirty="0">
+                <a:solidFill>
+                  <a:srgbClr val="24292E"/>
+                </a:solidFill>
+                <a:effectLst/>
+                <a:latin typeface="Consolas" panose="020B0609020204030204" pitchFamily="49" charset="0"/>
+              </a:rPr>
+              <a:t>(</a:t>
+            </a:r>
+            <a:r>
+              <a:rPr lang="fr-FR" sz="2400" b="0" dirty="0" err="1">
+                <a:solidFill>
+                  <a:srgbClr val="D73A49"/>
+                </a:solidFill>
+                <a:effectLst/>
+                <a:latin typeface="Consolas" panose="020B0609020204030204" pitchFamily="49" charset="0"/>
+              </a:rPr>
+              <a:t>int</a:t>
+            </a:r>
+            <a:r>
+              <a:rPr lang="fr-FR" sz="2400" b="0" dirty="0">
+                <a:solidFill>
+                  <a:srgbClr val="24292E"/>
+                </a:solidFill>
+                <a:effectLst/>
+                <a:latin typeface="Consolas" panose="020B0609020204030204" pitchFamily="49" charset="0"/>
+              </a:rPr>
+              <a:t> </a:t>
+            </a:r>
+            <a:r>
+              <a:rPr lang="fr-FR" sz="2400" b="0" dirty="0" err="1">
+                <a:solidFill>
+                  <a:srgbClr val="E36209"/>
+                </a:solidFill>
+                <a:effectLst/>
+                <a:latin typeface="Consolas" panose="020B0609020204030204" pitchFamily="49" charset="0"/>
+              </a:rPr>
+              <a:t>argc</a:t>
+            </a:r>
+            <a:r>
+              <a:rPr lang="fr-FR" sz="2400" b="0" dirty="0">
+                <a:solidFill>
+                  <a:srgbClr val="24292E"/>
+                </a:solidFill>
+                <a:effectLst/>
+                <a:latin typeface="Consolas" panose="020B0609020204030204" pitchFamily="49" charset="0"/>
+              </a:rPr>
+              <a:t>, </a:t>
+            </a:r>
+            <a:r>
+              <a:rPr lang="fr-FR" sz="2400" b="0" dirty="0">
+                <a:solidFill>
+                  <a:srgbClr val="D73A49"/>
+                </a:solidFill>
+                <a:effectLst/>
+                <a:latin typeface="Consolas" panose="020B0609020204030204" pitchFamily="49" charset="0"/>
+              </a:rPr>
+              <a:t>char</a:t>
+            </a:r>
+            <a:r>
+              <a:rPr lang="fr-FR" sz="2400" b="0" dirty="0">
+                <a:solidFill>
+                  <a:srgbClr val="24292E"/>
+                </a:solidFill>
+                <a:effectLst/>
+                <a:latin typeface="Consolas" panose="020B0609020204030204" pitchFamily="49" charset="0"/>
+              </a:rPr>
+              <a:t> </a:t>
+            </a:r>
+            <a:r>
+              <a:rPr lang="fr-FR" sz="2400" b="0" dirty="0">
+                <a:solidFill>
+                  <a:srgbClr val="D73A49"/>
+                </a:solidFill>
+                <a:effectLst/>
+                <a:latin typeface="Consolas" panose="020B0609020204030204" pitchFamily="49" charset="0"/>
+              </a:rPr>
+              <a:t>*</a:t>
+            </a:r>
+            <a:r>
+              <a:rPr lang="fr-FR" sz="2400" b="0" dirty="0">
+                <a:solidFill>
+                  <a:srgbClr val="24292E"/>
+                </a:solidFill>
+                <a:effectLst/>
+                <a:latin typeface="Consolas" panose="020B0609020204030204" pitchFamily="49" charset="0"/>
+              </a:rPr>
+              <a:t> </a:t>
+            </a:r>
+            <a:r>
+              <a:rPr lang="fr-FR" sz="2400" b="0" dirty="0" err="1">
+                <a:solidFill>
+                  <a:srgbClr val="E36209"/>
+                </a:solidFill>
+                <a:effectLst/>
+                <a:latin typeface="Consolas" panose="020B0609020204030204" pitchFamily="49" charset="0"/>
+              </a:rPr>
+              <a:t>argv</a:t>
+            </a:r>
+            <a:r>
+              <a:rPr lang="fr-FR" sz="2400" b="0" dirty="0">
+                <a:solidFill>
+                  <a:srgbClr val="D73A49"/>
+                </a:solidFill>
+                <a:effectLst/>
+                <a:latin typeface="Consolas" panose="020B0609020204030204" pitchFamily="49" charset="0"/>
+              </a:rPr>
+              <a:t>[]</a:t>
+            </a:r>
+            <a:r>
+              <a:rPr lang="fr-FR" sz="2400" b="0" dirty="0">
+                <a:solidFill>
+                  <a:srgbClr val="24292E"/>
+                </a:solidFill>
+                <a:effectLst/>
+                <a:latin typeface="Consolas" panose="020B0609020204030204" pitchFamily="49" charset="0"/>
+              </a:rPr>
+              <a:t>) {</a:t>
+            </a:r>
+          </a:p>
+          <a:p>
+            <a:pPr marL="0" indent="0">
+              <a:buNone/>
+            </a:pPr>
+            <a:r>
+              <a:rPr lang="fr-FR" sz="2400" b="0" dirty="0">
+                <a:solidFill>
+                  <a:srgbClr val="24292E"/>
+                </a:solidFill>
+                <a:effectLst/>
+                <a:latin typeface="Consolas" panose="020B0609020204030204" pitchFamily="49" charset="0"/>
+              </a:rPr>
+              <a:t>    </a:t>
+            </a:r>
+            <a:r>
+              <a:rPr lang="fr-FR" sz="2400" b="0" dirty="0" err="1">
+                <a:solidFill>
+                  <a:srgbClr val="D73A49"/>
+                </a:solidFill>
+                <a:effectLst/>
+                <a:latin typeface="Consolas" panose="020B0609020204030204" pitchFamily="49" charset="0"/>
+              </a:rPr>
+              <a:t>int</a:t>
+            </a:r>
+            <a:r>
+              <a:rPr lang="fr-FR" sz="2400" b="0" dirty="0">
+                <a:solidFill>
+                  <a:srgbClr val="24292E"/>
+                </a:solidFill>
+                <a:effectLst/>
+                <a:latin typeface="Consolas" panose="020B0609020204030204" pitchFamily="49" charset="0"/>
+              </a:rPr>
+              <a:t> i;</a:t>
+            </a:r>
+          </a:p>
+          <a:p>
+            <a:pPr marL="0" indent="0">
+              <a:buNone/>
+            </a:pPr>
+            <a:r>
+              <a:rPr lang="fr-FR" sz="2400" b="0" dirty="0">
+                <a:solidFill>
+                  <a:srgbClr val="24292E"/>
+                </a:solidFill>
+                <a:effectLst/>
+                <a:latin typeface="Consolas" panose="020B0609020204030204" pitchFamily="49" charset="0"/>
+              </a:rPr>
+              <a:t>    </a:t>
+            </a:r>
+            <a:r>
+              <a:rPr lang="fr-FR" sz="2400" b="0" dirty="0">
+                <a:solidFill>
+                  <a:srgbClr val="D73A49"/>
+                </a:solidFill>
+                <a:effectLst/>
+                <a:latin typeface="Consolas" panose="020B0609020204030204" pitchFamily="49" charset="0"/>
+              </a:rPr>
+              <a:t>for</a:t>
+            </a:r>
+            <a:r>
+              <a:rPr lang="fr-FR" sz="2400" b="0" dirty="0">
+                <a:solidFill>
+                  <a:srgbClr val="24292E"/>
+                </a:solidFill>
+                <a:effectLst/>
+                <a:latin typeface="Consolas" panose="020B0609020204030204" pitchFamily="49" charset="0"/>
+              </a:rPr>
+              <a:t> (i </a:t>
+            </a:r>
+            <a:r>
+              <a:rPr lang="fr-FR" sz="2400" b="0" dirty="0">
+                <a:solidFill>
+                  <a:srgbClr val="D73A49"/>
+                </a:solidFill>
+                <a:effectLst/>
+                <a:latin typeface="Consolas" panose="020B0609020204030204" pitchFamily="49" charset="0"/>
+              </a:rPr>
+              <a:t>=</a:t>
+            </a:r>
+            <a:r>
+              <a:rPr lang="fr-FR" sz="2400" b="0" dirty="0">
+                <a:solidFill>
+                  <a:srgbClr val="24292E"/>
+                </a:solidFill>
+                <a:effectLst/>
+                <a:latin typeface="Consolas" panose="020B0609020204030204" pitchFamily="49" charset="0"/>
+              </a:rPr>
+              <a:t> </a:t>
+            </a:r>
+            <a:r>
+              <a:rPr lang="fr-FR" sz="2400" b="0" dirty="0">
+                <a:solidFill>
+                  <a:srgbClr val="005CC5"/>
+                </a:solidFill>
+                <a:effectLst/>
+                <a:latin typeface="Consolas" panose="020B0609020204030204" pitchFamily="49" charset="0"/>
+              </a:rPr>
+              <a:t>0</a:t>
+            </a:r>
+            <a:r>
+              <a:rPr lang="fr-FR" sz="2400" b="0" dirty="0">
+                <a:solidFill>
+                  <a:srgbClr val="24292E"/>
+                </a:solidFill>
+                <a:effectLst/>
+                <a:latin typeface="Consolas" panose="020B0609020204030204" pitchFamily="49" charset="0"/>
+              </a:rPr>
+              <a:t>; i </a:t>
+            </a:r>
+            <a:r>
+              <a:rPr lang="fr-FR" sz="2400" b="0" dirty="0">
+                <a:solidFill>
+                  <a:srgbClr val="D73A49"/>
+                </a:solidFill>
+                <a:effectLst/>
+                <a:latin typeface="Consolas" panose="020B0609020204030204" pitchFamily="49" charset="0"/>
+              </a:rPr>
+              <a:t>&lt;</a:t>
+            </a:r>
+            <a:r>
+              <a:rPr lang="fr-FR" sz="2400" b="0" dirty="0">
+                <a:solidFill>
+                  <a:srgbClr val="24292E"/>
+                </a:solidFill>
+                <a:effectLst/>
+                <a:latin typeface="Consolas" panose="020B0609020204030204" pitchFamily="49" charset="0"/>
+              </a:rPr>
+              <a:t> </a:t>
+            </a:r>
+            <a:r>
+              <a:rPr lang="fr-FR" sz="2400" b="0" dirty="0" err="1">
+                <a:solidFill>
+                  <a:srgbClr val="E36209"/>
+                </a:solidFill>
+                <a:effectLst/>
+                <a:latin typeface="Consolas" panose="020B0609020204030204" pitchFamily="49" charset="0"/>
+              </a:rPr>
+              <a:t>argc</a:t>
+            </a:r>
+            <a:r>
+              <a:rPr lang="fr-FR" sz="2400" b="0" dirty="0">
+                <a:solidFill>
+                  <a:srgbClr val="24292E"/>
+                </a:solidFill>
+                <a:effectLst/>
+                <a:latin typeface="Consolas" panose="020B0609020204030204" pitchFamily="49" charset="0"/>
+              </a:rPr>
+              <a:t>; i</a:t>
+            </a:r>
+            <a:r>
+              <a:rPr lang="fr-FR" sz="2400" b="0" dirty="0">
+                <a:solidFill>
+                  <a:srgbClr val="D73A49"/>
+                </a:solidFill>
+                <a:effectLst/>
+                <a:latin typeface="Consolas" panose="020B0609020204030204" pitchFamily="49" charset="0"/>
+              </a:rPr>
+              <a:t>++</a:t>
+            </a:r>
+            <a:r>
+              <a:rPr lang="fr-FR" sz="2400" b="0" dirty="0">
+                <a:solidFill>
+                  <a:srgbClr val="24292E"/>
+                </a:solidFill>
+                <a:effectLst/>
+                <a:latin typeface="Consolas" panose="020B0609020204030204" pitchFamily="49" charset="0"/>
+              </a:rPr>
+              <a:t>) {</a:t>
+            </a:r>
+          </a:p>
+          <a:p>
+            <a:pPr marL="0" indent="0">
+              <a:buNone/>
+            </a:pPr>
+            <a:r>
+              <a:rPr lang="fr-FR" sz="2400" b="0" dirty="0">
+                <a:solidFill>
+                  <a:srgbClr val="24292E"/>
+                </a:solidFill>
+                <a:effectLst/>
+                <a:latin typeface="Consolas" panose="020B0609020204030204" pitchFamily="49" charset="0"/>
+              </a:rPr>
+              <a:t>        </a:t>
+            </a:r>
+            <a:r>
+              <a:rPr lang="fr-FR" sz="2400" b="0" dirty="0">
+                <a:solidFill>
+                  <a:srgbClr val="6F42C1"/>
+                </a:solidFill>
+                <a:effectLst/>
+                <a:latin typeface="Consolas" panose="020B0609020204030204" pitchFamily="49" charset="0"/>
+              </a:rPr>
+              <a:t>printf</a:t>
+            </a:r>
+            <a:r>
+              <a:rPr lang="fr-FR" sz="2400" b="0" dirty="0">
+                <a:solidFill>
+                  <a:srgbClr val="24292E"/>
+                </a:solidFill>
+                <a:effectLst/>
+                <a:latin typeface="Consolas" panose="020B0609020204030204" pitchFamily="49" charset="0"/>
+              </a:rPr>
+              <a:t>(</a:t>
+            </a:r>
+            <a:r>
+              <a:rPr lang="fr-FR" sz="2400" b="0" dirty="0">
+                <a:solidFill>
+                  <a:srgbClr val="032F62"/>
+                </a:solidFill>
+                <a:effectLst/>
+                <a:latin typeface="Consolas" panose="020B0609020204030204" pitchFamily="49" charset="0"/>
+              </a:rPr>
+              <a:t>"</a:t>
+            </a:r>
+            <a:r>
+              <a:rPr lang="fr-FR" sz="2400" b="0" dirty="0">
+                <a:solidFill>
+                  <a:srgbClr val="005CC5"/>
+                </a:solidFill>
+                <a:effectLst/>
+                <a:latin typeface="Consolas" panose="020B0609020204030204" pitchFamily="49" charset="0"/>
+              </a:rPr>
+              <a:t>%d</a:t>
+            </a:r>
+            <a:r>
+              <a:rPr lang="fr-FR" sz="2400" b="0" dirty="0">
+                <a:solidFill>
+                  <a:srgbClr val="032F62"/>
+                </a:solidFill>
+                <a:effectLst/>
+                <a:latin typeface="Consolas" panose="020B0609020204030204" pitchFamily="49" charset="0"/>
+              </a:rPr>
+              <a:t> : </a:t>
+            </a:r>
+            <a:r>
+              <a:rPr lang="fr-FR" sz="2400" b="0" dirty="0">
+                <a:solidFill>
+                  <a:srgbClr val="005CC5"/>
+                </a:solidFill>
+                <a:effectLst/>
+                <a:latin typeface="Consolas" panose="020B0609020204030204" pitchFamily="49" charset="0"/>
+              </a:rPr>
+              <a:t>%s\n</a:t>
+            </a:r>
+            <a:r>
+              <a:rPr lang="fr-FR" sz="2400" b="0" dirty="0">
+                <a:solidFill>
+                  <a:srgbClr val="032F62"/>
+                </a:solidFill>
+                <a:effectLst/>
+                <a:latin typeface="Consolas" panose="020B0609020204030204" pitchFamily="49" charset="0"/>
+              </a:rPr>
+              <a:t>"</a:t>
+            </a:r>
+            <a:r>
+              <a:rPr lang="fr-FR" sz="2400" b="0" dirty="0">
+                <a:solidFill>
+                  <a:srgbClr val="24292E"/>
+                </a:solidFill>
+                <a:effectLst/>
+                <a:latin typeface="Consolas" panose="020B0609020204030204" pitchFamily="49" charset="0"/>
+              </a:rPr>
+              <a:t>, i, </a:t>
+            </a:r>
+            <a:r>
+              <a:rPr lang="fr-FR" sz="2400" b="0" dirty="0">
+                <a:solidFill>
+                  <a:srgbClr val="D73A49"/>
+                </a:solidFill>
+                <a:effectLst/>
+                <a:latin typeface="Consolas" panose="020B0609020204030204" pitchFamily="49" charset="0"/>
+              </a:rPr>
+              <a:t>*</a:t>
+            </a:r>
+            <a:r>
+              <a:rPr lang="fr-FR" sz="2400" b="0" dirty="0">
+                <a:solidFill>
+                  <a:srgbClr val="24292E"/>
+                </a:solidFill>
+                <a:effectLst/>
+                <a:latin typeface="Consolas" panose="020B0609020204030204" pitchFamily="49" charset="0"/>
+              </a:rPr>
+              <a:t>(</a:t>
+            </a:r>
+            <a:r>
+              <a:rPr lang="fr-FR" sz="2400" b="0" dirty="0" err="1">
+                <a:solidFill>
+                  <a:srgbClr val="E36209"/>
+                </a:solidFill>
+                <a:effectLst/>
+                <a:latin typeface="Consolas" panose="020B0609020204030204" pitchFamily="49" charset="0"/>
+              </a:rPr>
+              <a:t>argv</a:t>
+            </a:r>
+            <a:r>
+              <a:rPr lang="fr-FR" sz="2400" b="0" dirty="0">
+                <a:solidFill>
+                  <a:srgbClr val="24292E"/>
+                </a:solidFill>
+                <a:effectLst/>
+                <a:latin typeface="Consolas" panose="020B0609020204030204" pitchFamily="49" charset="0"/>
+              </a:rPr>
+              <a:t> </a:t>
+            </a:r>
+            <a:r>
+              <a:rPr lang="fr-FR" sz="2400" b="0" dirty="0">
+                <a:solidFill>
+                  <a:srgbClr val="D73A49"/>
+                </a:solidFill>
+                <a:effectLst/>
+                <a:latin typeface="Consolas" panose="020B0609020204030204" pitchFamily="49" charset="0"/>
+              </a:rPr>
+              <a:t>+</a:t>
+            </a:r>
+            <a:r>
+              <a:rPr lang="fr-FR" sz="2400" b="0" dirty="0">
+                <a:solidFill>
+                  <a:srgbClr val="24292E"/>
+                </a:solidFill>
+                <a:effectLst/>
+                <a:latin typeface="Consolas" panose="020B0609020204030204" pitchFamily="49" charset="0"/>
+              </a:rPr>
+              <a:t> i));</a:t>
+            </a:r>
+          </a:p>
+          <a:p>
+            <a:pPr marL="0" indent="0">
+              <a:buNone/>
+            </a:pPr>
+            <a:r>
+              <a:rPr lang="fr-FR" sz="2400" b="0" dirty="0">
+                <a:solidFill>
+                  <a:srgbClr val="24292E"/>
+                </a:solidFill>
+                <a:effectLst/>
+                <a:latin typeface="Consolas" panose="020B0609020204030204" pitchFamily="49" charset="0"/>
+              </a:rPr>
+              <a:t>    }</a:t>
+            </a:r>
+          </a:p>
+          <a:p>
+            <a:pPr marL="0" indent="0">
+              <a:buNone/>
+            </a:pPr>
+            <a:r>
+              <a:rPr lang="fr-FR" sz="2400" b="0" dirty="0">
+                <a:solidFill>
+                  <a:srgbClr val="24292E"/>
+                </a:solidFill>
+                <a:effectLst/>
+                <a:latin typeface="Consolas" panose="020B0609020204030204" pitchFamily="49" charset="0"/>
+              </a:rPr>
+              <a:t>    </a:t>
+            </a:r>
+            <a:r>
+              <a:rPr lang="fr-FR" sz="2400" b="0" dirty="0">
+                <a:solidFill>
+                  <a:srgbClr val="D73A49"/>
+                </a:solidFill>
+                <a:effectLst/>
+                <a:latin typeface="Consolas" panose="020B0609020204030204" pitchFamily="49" charset="0"/>
+              </a:rPr>
+              <a:t>return</a:t>
+            </a:r>
+            <a:r>
+              <a:rPr lang="fr-FR" sz="2400" b="0" dirty="0">
+                <a:solidFill>
+                  <a:srgbClr val="24292E"/>
+                </a:solidFill>
+                <a:effectLst/>
+                <a:latin typeface="Consolas" panose="020B0609020204030204" pitchFamily="49" charset="0"/>
+              </a:rPr>
+              <a:t> </a:t>
+            </a:r>
+            <a:r>
+              <a:rPr lang="fr-FR" sz="2400" b="0" dirty="0">
+                <a:solidFill>
+                  <a:srgbClr val="005CC5"/>
+                </a:solidFill>
+                <a:effectLst/>
+                <a:latin typeface="Consolas" panose="020B0609020204030204" pitchFamily="49" charset="0"/>
+              </a:rPr>
+              <a:t>0</a:t>
+            </a:r>
+            <a:r>
+              <a:rPr lang="fr-FR" sz="2400" b="0" dirty="0">
+                <a:solidFill>
+                  <a:srgbClr val="24292E"/>
+                </a:solidFill>
+                <a:effectLst/>
+                <a:latin typeface="Consolas" panose="020B0609020204030204" pitchFamily="49" charset="0"/>
+              </a:rPr>
+              <a:t>;</a:t>
+            </a:r>
+          </a:p>
+          <a:p>
+            <a:pPr marL="0" indent="0">
+              <a:buNone/>
+            </a:pPr>
+            <a:r>
+              <a:rPr lang="fr-FR" sz="2400" b="0" dirty="0">
+                <a:solidFill>
+                  <a:srgbClr val="24292E"/>
+                </a:solidFill>
+                <a:effectLst/>
+                <a:latin typeface="Consolas" panose="020B0609020204030204" pitchFamily="49" charset="0"/>
+              </a:rPr>
+              <a:t>}</a:t>
+            </a:r>
+          </a:p>
+          <a:p>
+            <a:pPr marL="0" indent="0">
+              <a:buNone/>
+            </a:pPr>
+            <a:endParaRPr lang="fr-FR" sz="3200" dirty="0"/>
+          </a:p>
+        </p:txBody>
+      </p:sp>
+      <p:pic>
+        <p:nvPicPr>
+          <p:cNvPr id="4" name="Image 3">
+            <a:extLst>
+              <a:ext uri="{FF2B5EF4-FFF2-40B4-BE49-F238E27FC236}">
+                <a16:creationId xmlns:a16="http://schemas.microsoft.com/office/drawing/2014/main" id="{E4D6A548-17AB-4AB0-8651-496F9DCECDAD}"/>
+              </a:ext>
+            </a:extLst>
+          </p:cNvPr>
+          <p:cNvPicPr>
+            <a:picLocks noChangeAspect="1"/>
+          </p:cNvPicPr>
+          <p:nvPr/>
+        </p:nvPicPr>
+        <p:blipFill>
+          <a:blip r:embed="rId3"/>
+          <a:stretch>
+            <a:fillRect/>
+          </a:stretch>
+        </p:blipFill>
+        <p:spPr>
+          <a:xfrm>
+            <a:off x="2989385" y="5135788"/>
+            <a:ext cx="8951508" cy="1522920"/>
+          </a:xfrm>
+          <a:prstGeom prst="rect">
+            <a:avLst/>
+          </a:prstGeom>
+        </p:spPr>
+      </p:pic>
+      <p:graphicFrame>
+        <p:nvGraphicFramePr>
+          <p:cNvPr id="5" name="Tableau 5">
+            <a:extLst>
+              <a:ext uri="{FF2B5EF4-FFF2-40B4-BE49-F238E27FC236}">
+                <a16:creationId xmlns:a16="http://schemas.microsoft.com/office/drawing/2014/main" id="{38691A5C-38B3-4A2C-957E-0035898788BB}"/>
+              </a:ext>
+            </a:extLst>
+          </p:cNvPr>
+          <p:cNvGraphicFramePr>
+            <a:graphicFrameLocks noGrp="1"/>
+          </p:cNvGraphicFramePr>
+          <p:nvPr>
+            <p:extLst>
+              <p:ext uri="{D42A27DB-BD31-4B8C-83A1-F6EECF244321}">
+                <p14:modId xmlns:p14="http://schemas.microsoft.com/office/powerpoint/2010/main" val="3212776016"/>
+              </p:ext>
+            </p:extLst>
+          </p:nvPr>
+        </p:nvGraphicFramePr>
+        <p:xfrm>
+          <a:off x="9331569" y="4585905"/>
+          <a:ext cx="2609324" cy="1259840"/>
+        </p:xfrm>
+        <a:graphic>
+          <a:graphicData uri="http://schemas.openxmlformats.org/drawingml/2006/table">
+            <a:tbl>
+              <a:tblPr firstRow="1" bandRow="1">
+                <a:tableStyleId>{5C22544A-7EE6-4342-B048-85BDC9FD1C3A}</a:tableStyleId>
+              </a:tblPr>
+              <a:tblGrid>
+                <a:gridCol w="721391">
+                  <a:extLst>
+                    <a:ext uri="{9D8B030D-6E8A-4147-A177-3AD203B41FA5}">
+                      <a16:colId xmlns:a16="http://schemas.microsoft.com/office/drawing/2014/main" val="76644453"/>
+                    </a:ext>
+                  </a:extLst>
+                </a:gridCol>
+                <a:gridCol w="802609">
+                  <a:extLst>
+                    <a:ext uri="{9D8B030D-6E8A-4147-A177-3AD203B41FA5}">
+                      <a16:colId xmlns:a16="http://schemas.microsoft.com/office/drawing/2014/main" val="1496158657"/>
+                    </a:ext>
+                  </a:extLst>
+                </a:gridCol>
+                <a:gridCol w="773723">
+                  <a:extLst>
+                    <a:ext uri="{9D8B030D-6E8A-4147-A177-3AD203B41FA5}">
+                      <a16:colId xmlns:a16="http://schemas.microsoft.com/office/drawing/2014/main" val="3925806788"/>
+                    </a:ext>
+                  </a:extLst>
+                </a:gridCol>
+                <a:gridCol w="311601">
+                  <a:extLst>
+                    <a:ext uri="{9D8B030D-6E8A-4147-A177-3AD203B41FA5}">
+                      <a16:colId xmlns:a16="http://schemas.microsoft.com/office/drawing/2014/main" val="3421181771"/>
+                    </a:ext>
+                  </a:extLst>
+                </a:gridCol>
+              </a:tblGrid>
+              <a:tr h="370840">
+                <a:tc gridSpan="4">
+                  <a:txBody>
+                    <a:bodyPr/>
+                    <a:lstStyle/>
+                    <a:p>
+                      <a:pPr algn="ctr"/>
+                      <a:r>
+                        <a:rPr lang="fr-FR" sz="2800" b="1" dirty="0" err="1">
+                          <a:solidFill>
+                            <a:srgbClr val="FF0000"/>
+                          </a:solidFill>
+                        </a:rPr>
+                        <a:t>argv</a:t>
+                      </a:r>
+                      <a:endParaRPr lang="fr-FR" sz="2800" b="1" dirty="0">
+                        <a:solidFill>
+                          <a:srgbClr val="FF0000"/>
+                        </a:solidFill>
+                      </a:endParaRPr>
+                    </a:p>
+                  </a:txBody>
+                  <a:tcPr>
+                    <a:lnL w="38100" cap="flat" cmpd="sng" algn="ctr">
+                      <a:solidFill>
+                        <a:srgbClr val="FF0000"/>
+                      </a:solidFill>
+                      <a:prstDash val="solid"/>
+                      <a:round/>
+                      <a:headEnd type="none" w="med" len="med"/>
+                      <a:tailEnd type="none" w="med" len="med"/>
+                    </a:lnL>
+                    <a:lnR w="38100" cap="flat" cmpd="sng" algn="ctr">
+                      <a:solidFill>
+                        <a:srgbClr val="FF0000"/>
+                      </a:solidFill>
+                      <a:prstDash val="solid"/>
+                      <a:round/>
+                      <a:headEnd type="none" w="med" len="med"/>
+                      <a:tailEnd type="none" w="med" len="med"/>
+                    </a:lnR>
+                    <a:lnT w="38100" cap="flat" cmpd="sng" algn="ctr">
+                      <a:solidFill>
+                        <a:srgbClr val="FF0000"/>
+                      </a:solidFill>
+                      <a:prstDash val="solid"/>
+                      <a:round/>
+                      <a:headEnd type="none" w="med" len="med"/>
+                      <a:tailEnd type="none" w="med" len="med"/>
+                    </a:lnT>
+                    <a:lnB w="38100" cap="flat" cmpd="sng" algn="ctr">
+                      <a:solidFill>
+                        <a:srgbClr val="FF0000"/>
+                      </a:solidFill>
+                      <a:prstDash val="solid"/>
+                      <a:round/>
+                      <a:headEnd type="none" w="med" len="med"/>
+                      <a:tailEnd type="none" w="med" len="med"/>
+                    </a:lnB>
+                    <a:noFill/>
+                  </a:tcPr>
+                </a:tc>
+                <a:tc hMerge="1">
+                  <a:txBody>
+                    <a:bodyPr/>
+                    <a:lstStyle/>
+                    <a:p>
+                      <a:endParaRPr lang="fr-FR" dirty="0"/>
+                    </a:p>
+                  </a:txBody>
+                  <a:tcPr>
+                    <a:lnL w="38100" cap="flat" cmpd="sng" algn="ctr">
+                      <a:solidFill>
+                        <a:srgbClr val="FF0000"/>
+                      </a:solidFill>
+                      <a:prstDash val="solid"/>
+                      <a:round/>
+                      <a:headEnd type="none" w="med" len="med"/>
+                      <a:tailEnd type="none" w="med" len="med"/>
+                    </a:lnL>
+                    <a:lnR w="38100" cap="flat" cmpd="sng" algn="ctr">
+                      <a:solidFill>
+                        <a:srgbClr val="FF0000"/>
+                      </a:solidFill>
+                      <a:prstDash val="solid"/>
+                      <a:round/>
+                      <a:headEnd type="none" w="med" len="med"/>
+                      <a:tailEnd type="none" w="med" len="med"/>
+                    </a:lnR>
+                    <a:lnT w="38100" cap="flat" cmpd="sng" algn="ctr">
+                      <a:solidFill>
+                        <a:srgbClr val="FF0000"/>
+                      </a:solidFill>
+                      <a:prstDash val="solid"/>
+                      <a:round/>
+                      <a:headEnd type="none" w="med" len="med"/>
+                      <a:tailEnd type="none" w="med" len="med"/>
+                    </a:lnT>
+                    <a:lnB w="38100" cap="flat" cmpd="sng" algn="ctr">
+                      <a:solidFill>
+                        <a:srgbClr val="FF0000"/>
+                      </a:solidFill>
+                      <a:prstDash val="solid"/>
+                      <a:round/>
+                      <a:headEnd type="none" w="med" len="med"/>
+                      <a:tailEnd type="none" w="med" len="med"/>
+                    </a:lnB>
+                    <a:noFill/>
+                  </a:tcPr>
+                </a:tc>
+                <a:tc hMerge="1">
+                  <a:txBody>
+                    <a:bodyPr/>
+                    <a:lstStyle/>
+                    <a:p>
+                      <a:endParaRPr lang="fr-FR" dirty="0"/>
+                    </a:p>
+                  </a:txBody>
+                  <a:tcPr>
+                    <a:lnL w="38100" cap="flat" cmpd="sng" algn="ctr">
+                      <a:solidFill>
+                        <a:srgbClr val="FF0000"/>
+                      </a:solidFill>
+                      <a:prstDash val="solid"/>
+                      <a:round/>
+                      <a:headEnd type="none" w="med" len="med"/>
+                      <a:tailEnd type="none" w="med" len="med"/>
+                    </a:lnL>
+                    <a:lnR w="38100" cap="flat" cmpd="sng" algn="ctr">
+                      <a:solidFill>
+                        <a:srgbClr val="FF0000"/>
+                      </a:solidFill>
+                      <a:prstDash val="solid"/>
+                      <a:round/>
+                      <a:headEnd type="none" w="med" len="med"/>
+                      <a:tailEnd type="none" w="med" len="med"/>
+                    </a:lnR>
+                    <a:lnT w="38100" cap="flat" cmpd="sng" algn="ctr">
+                      <a:solidFill>
+                        <a:srgbClr val="FF0000"/>
+                      </a:solidFill>
+                      <a:prstDash val="solid"/>
+                      <a:round/>
+                      <a:headEnd type="none" w="med" len="med"/>
+                      <a:tailEnd type="none" w="med" len="med"/>
+                    </a:lnT>
+                    <a:lnB w="38100" cap="flat" cmpd="sng" algn="ctr">
+                      <a:solidFill>
+                        <a:srgbClr val="FF0000"/>
+                      </a:solidFill>
+                      <a:prstDash val="solid"/>
+                      <a:round/>
+                      <a:headEnd type="none" w="med" len="med"/>
+                      <a:tailEnd type="none" w="med" len="med"/>
+                    </a:lnB>
+                    <a:noFill/>
+                  </a:tcPr>
+                </a:tc>
+                <a:tc hMerge="1">
+                  <a:txBody>
+                    <a:bodyPr/>
+                    <a:lstStyle/>
+                    <a:p>
+                      <a:endParaRPr lang="fr-FR" dirty="0"/>
+                    </a:p>
+                  </a:txBody>
+                  <a:tcPr>
+                    <a:lnL w="38100" cap="flat" cmpd="sng" algn="ctr">
+                      <a:solidFill>
+                        <a:srgbClr val="FF0000"/>
+                      </a:solidFill>
+                      <a:prstDash val="solid"/>
+                      <a:round/>
+                      <a:headEnd type="none" w="med" len="med"/>
+                      <a:tailEnd type="none" w="med" len="med"/>
+                    </a:lnL>
+                    <a:lnR w="38100" cap="flat" cmpd="sng" algn="ctr">
+                      <a:solidFill>
+                        <a:srgbClr val="FF0000"/>
+                      </a:solidFill>
+                      <a:prstDash val="solid"/>
+                      <a:round/>
+                      <a:headEnd type="none" w="med" len="med"/>
+                      <a:tailEnd type="none" w="med" len="med"/>
+                    </a:lnR>
+                    <a:lnT w="38100" cap="flat" cmpd="sng" algn="ctr">
+                      <a:solidFill>
+                        <a:srgbClr val="FF0000"/>
+                      </a:solidFill>
+                      <a:prstDash val="solid"/>
+                      <a:round/>
+                      <a:headEnd type="none" w="med" len="med"/>
+                      <a:tailEnd type="none" w="med" len="med"/>
+                    </a:lnT>
+                    <a:lnB w="38100" cap="flat" cmpd="sng" algn="ctr">
+                      <a:solidFill>
+                        <a:srgbClr val="FF0000"/>
+                      </a:solidFill>
+                      <a:prstDash val="solid"/>
+                      <a:round/>
+                      <a:headEnd type="none" w="med" len="med"/>
+                      <a:tailEnd type="none" w="med" len="med"/>
+                    </a:lnB>
+                    <a:noFill/>
+                  </a:tcPr>
+                </a:tc>
+                <a:extLst>
+                  <a:ext uri="{0D108BD9-81ED-4DB2-BD59-A6C34878D82A}">
+                    <a16:rowId xmlns:a16="http://schemas.microsoft.com/office/drawing/2014/main" val="3184471830"/>
+                  </a:ext>
+                </a:extLst>
+              </a:tr>
+              <a:tr h="370840">
+                <a:tc>
+                  <a:txBody>
+                    <a:bodyPr/>
+                    <a:lstStyle/>
+                    <a:p>
+                      <a:endParaRPr lang="fr-FR"/>
+                    </a:p>
+                  </a:txBody>
+                  <a:tcPr>
+                    <a:lnL w="38100" cap="flat" cmpd="sng" algn="ctr">
+                      <a:solidFill>
+                        <a:srgbClr val="FF0000"/>
+                      </a:solidFill>
+                      <a:prstDash val="solid"/>
+                      <a:round/>
+                      <a:headEnd type="none" w="med" len="med"/>
+                      <a:tailEnd type="none" w="med" len="med"/>
+                    </a:lnL>
+                    <a:lnR w="38100" cap="flat" cmpd="sng" algn="ctr">
+                      <a:solidFill>
+                        <a:srgbClr val="FF0000"/>
+                      </a:solidFill>
+                      <a:prstDash val="solid"/>
+                      <a:round/>
+                      <a:headEnd type="none" w="med" len="med"/>
+                      <a:tailEnd type="none" w="med" len="med"/>
+                    </a:lnR>
+                    <a:lnT w="38100" cap="flat" cmpd="sng" algn="ctr">
+                      <a:solidFill>
+                        <a:srgbClr val="FF0000"/>
+                      </a:solidFill>
+                      <a:prstDash val="solid"/>
+                      <a:round/>
+                      <a:headEnd type="none" w="med" len="med"/>
+                      <a:tailEnd type="none" w="med" len="med"/>
+                    </a:lnT>
+                    <a:lnB w="38100" cap="flat" cmpd="sng" algn="ctr">
+                      <a:solidFill>
+                        <a:srgbClr val="FF0000"/>
+                      </a:solidFill>
+                      <a:prstDash val="solid"/>
+                      <a:round/>
+                      <a:headEnd type="none" w="med" len="med"/>
+                      <a:tailEnd type="none" w="med" len="med"/>
+                    </a:lnB>
+                    <a:noFill/>
+                  </a:tcPr>
+                </a:tc>
+                <a:tc>
+                  <a:txBody>
+                    <a:bodyPr/>
+                    <a:lstStyle/>
+                    <a:p>
+                      <a:endParaRPr lang="fr-FR" dirty="0"/>
+                    </a:p>
+                  </a:txBody>
+                  <a:tcPr>
+                    <a:lnL w="38100" cap="flat" cmpd="sng" algn="ctr">
+                      <a:solidFill>
+                        <a:srgbClr val="FF0000"/>
+                      </a:solidFill>
+                      <a:prstDash val="solid"/>
+                      <a:round/>
+                      <a:headEnd type="none" w="med" len="med"/>
+                      <a:tailEnd type="none" w="med" len="med"/>
+                    </a:lnL>
+                    <a:lnR w="38100" cap="flat" cmpd="sng" algn="ctr">
+                      <a:solidFill>
+                        <a:srgbClr val="FF0000"/>
+                      </a:solidFill>
+                      <a:prstDash val="solid"/>
+                      <a:round/>
+                      <a:headEnd type="none" w="med" len="med"/>
+                      <a:tailEnd type="none" w="med" len="med"/>
+                    </a:lnR>
+                    <a:lnT w="38100" cap="flat" cmpd="sng" algn="ctr">
+                      <a:solidFill>
+                        <a:srgbClr val="FF0000"/>
+                      </a:solidFill>
+                      <a:prstDash val="solid"/>
+                      <a:round/>
+                      <a:headEnd type="none" w="med" len="med"/>
+                      <a:tailEnd type="none" w="med" len="med"/>
+                    </a:lnT>
+                    <a:lnB w="38100" cap="flat" cmpd="sng" algn="ctr">
+                      <a:solidFill>
+                        <a:srgbClr val="FF0000"/>
+                      </a:solidFill>
+                      <a:prstDash val="solid"/>
+                      <a:round/>
+                      <a:headEnd type="none" w="med" len="med"/>
+                      <a:tailEnd type="none" w="med" len="med"/>
+                    </a:lnB>
+                    <a:noFill/>
+                  </a:tcPr>
+                </a:tc>
+                <a:tc>
+                  <a:txBody>
+                    <a:bodyPr/>
+                    <a:lstStyle/>
+                    <a:p>
+                      <a:endParaRPr lang="fr-FR" dirty="0"/>
+                    </a:p>
+                  </a:txBody>
+                  <a:tcPr>
+                    <a:lnL w="38100" cap="flat" cmpd="sng" algn="ctr">
+                      <a:solidFill>
+                        <a:srgbClr val="FF0000"/>
+                      </a:solidFill>
+                      <a:prstDash val="solid"/>
+                      <a:round/>
+                      <a:headEnd type="none" w="med" len="med"/>
+                      <a:tailEnd type="none" w="med" len="med"/>
+                    </a:lnL>
+                    <a:lnR w="38100" cap="flat" cmpd="sng" algn="ctr">
+                      <a:solidFill>
+                        <a:srgbClr val="FF0000"/>
+                      </a:solidFill>
+                      <a:prstDash val="solid"/>
+                      <a:round/>
+                      <a:headEnd type="none" w="med" len="med"/>
+                      <a:tailEnd type="none" w="med" len="med"/>
+                    </a:lnR>
+                    <a:lnT w="38100" cap="flat" cmpd="sng" algn="ctr">
+                      <a:solidFill>
+                        <a:srgbClr val="FF0000"/>
+                      </a:solidFill>
+                      <a:prstDash val="solid"/>
+                      <a:round/>
+                      <a:headEnd type="none" w="med" len="med"/>
+                      <a:tailEnd type="none" w="med" len="med"/>
+                    </a:lnT>
+                    <a:lnB w="38100" cap="flat" cmpd="sng" algn="ctr">
+                      <a:solidFill>
+                        <a:srgbClr val="FF0000"/>
+                      </a:solidFill>
+                      <a:prstDash val="solid"/>
+                      <a:round/>
+                      <a:headEnd type="none" w="med" len="med"/>
+                      <a:tailEnd type="none" w="med" len="med"/>
+                    </a:lnB>
+                    <a:noFill/>
+                  </a:tcPr>
+                </a:tc>
+                <a:tc>
+                  <a:txBody>
+                    <a:bodyPr/>
+                    <a:lstStyle/>
+                    <a:p>
+                      <a:endParaRPr lang="fr-FR" dirty="0"/>
+                    </a:p>
+                  </a:txBody>
+                  <a:tcPr>
+                    <a:lnL w="38100" cap="flat" cmpd="sng" algn="ctr">
+                      <a:solidFill>
+                        <a:srgbClr val="FF0000"/>
+                      </a:solidFill>
+                      <a:prstDash val="solid"/>
+                      <a:round/>
+                      <a:headEnd type="none" w="med" len="med"/>
+                      <a:tailEnd type="none" w="med" len="med"/>
+                    </a:lnL>
+                    <a:lnR w="38100" cap="flat" cmpd="sng" algn="ctr">
+                      <a:solidFill>
+                        <a:srgbClr val="FF0000"/>
+                      </a:solidFill>
+                      <a:prstDash val="solid"/>
+                      <a:round/>
+                      <a:headEnd type="none" w="med" len="med"/>
+                      <a:tailEnd type="none" w="med" len="med"/>
+                    </a:lnR>
+                    <a:lnT w="38100" cap="flat" cmpd="sng" algn="ctr">
+                      <a:solidFill>
+                        <a:srgbClr val="FF0000"/>
+                      </a:solidFill>
+                      <a:prstDash val="solid"/>
+                      <a:round/>
+                      <a:headEnd type="none" w="med" len="med"/>
+                      <a:tailEnd type="none" w="med" len="med"/>
+                    </a:lnT>
+                    <a:lnB w="38100" cap="flat" cmpd="sng" algn="ctr">
+                      <a:solidFill>
+                        <a:srgbClr val="FF0000"/>
+                      </a:solidFill>
+                      <a:prstDash val="solid"/>
+                      <a:round/>
+                      <a:headEnd type="none" w="med" len="med"/>
+                      <a:tailEnd type="none" w="med" len="med"/>
+                    </a:lnB>
+                    <a:noFill/>
+                  </a:tcPr>
+                </a:tc>
+                <a:extLst>
+                  <a:ext uri="{0D108BD9-81ED-4DB2-BD59-A6C34878D82A}">
+                    <a16:rowId xmlns:a16="http://schemas.microsoft.com/office/drawing/2014/main" val="3792971398"/>
+                  </a:ext>
+                </a:extLst>
+              </a:tr>
+              <a:tr h="370840">
+                <a:tc>
+                  <a:txBody>
+                    <a:bodyPr/>
+                    <a:lstStyle/>
+                    <a:p>
+                      <a:pPr algn="ctr"/>
+                      <a:r>
+                        <a:rPr lang="fr-FR" dirty="0">
+                          <a:solidFill>
+                            <a:srgbClr val="FF0000"/>
+                          </a:solidFill>
+                        </a:rPr>
+                        <a:t>0</a:t>
+                      </a:r>
+                    </a:p>
+                  </a:txBody>
+                  <a:tcPr>
+                    <a:lnL w="38100" cap="flat" cmpd="sng" algn="ctr">
+                      <a:solidFill>
+                        <a:srgbClr val="FF0000"/>
+                      </a:solidFill>
+                      <a:prstDash val="solid"/>
+                      <a:round/>
+                      <a:headEnd type="none" w="med" len="med"/>
+                      <a:tailEnd type="none" w="med" len="med"/>
+                    </a:lnL>
+                    <a:lnR w="38100" cap="flat" cmpd="sng" algn="ctr">
+                      <a:solidFill>
+                        <a:srgbClr val="FF0000"/>
+                      </a:solidFill>
+                      <a:prstDash val="solid"/>
+                      <a:round/>
+                      <a:headEnd type="none" w="med" len="med"/>
+                      <a:tailEnd type="none" w="med" len="med"/>
+                    </a:lnR>
+                    <a:lnT w="38100" cap="flat" cmpd="sng" algn="ctr">
+                      <a:solidFill>
+                        <a:srgbClr val="FF0000"/>
+                      </a:solidFill>
+                      <a:prstDash val="solid"/>
+                      <a:round/>
+                      <a:headEnd type="none" w="med" len="med"/>
+                      <a:tailEnd type="none" w="med" len="med"/>
+                    </a:lnT>
+                    <a:lnB w="38100" cap="flat" cmpd="sng" algn="ctr">
+                      <a:solidFill>
+                        <a:srgbClr val="FF0000"/>
+                      </a:solidFill>
+                      <a:prstDash val="solid"/>
+                      <a:round/>
+                      <a:headEnd type="none" w="med" len="med"/>
+                      <a:tailEnd type="none" w="med" len="med"/>
+                    </a:lnB>
+                    <a:noFill/>
+                  </a:tcPr>
+                </a:tc>
+                <a:tc>
+                  <a:txBody>
+                    <a:bodyPr/>
+                    <a:lstStyle/>
+                    <a:p>
+                      <a:pPr algn="ctr"/>
+                      <a:r>
+                        <a:rPr lang="fr-FR" dirty="0">
+                          <a:solidFill>
+                            <a:srgbClr val="FF0000"/>
+                          </a:solidFill>
+                        </a:rPr>
+                        <a:t>1</a:t>
+                      </a:r>
+                    </a:p>
+                  </a:txBody>
+                  <a:tcPr>
+                    <a:lnL w="38100" cap="flat" cmpd="sng" algn="ctr">
+                      <a:solidFill>
+                        <a:srgbClr val="FF0000"/>
+                      </a:solidFill>
+                      <a:prstDash val="solid"/>
+                      <a:round/>
+                      <a:headEnd type="none" w="med" len="med"/>
+                      <a:tailEnd type="none" w="med" len="med"/>
+                    </a:lnL>
+                    <a:lnR w="38100" cap="flat" cmpd="sng" algn="ctr">
+                      <a:solidFill>
+                        <a:srgbClr val="FF0000"/>
+                      </a:solidFill>
+                      <a:prstDash val="solid"/>
+                      <a:round/>
+                      <a:headEnd type="none" w="med" len="med"/>
+                      <a:tailEnd type="none" w="med" len="med"/>
+                    </a:lnR>
+                    <a:lnT w="38100" cap="flat" cmpd="sng" algn="ctr">
+                      <a:solidFill>
+                        <a:srgbClr val="FF0000"/>
+                      </a:solidFill>
+                      <a:prstDash val="solid"/>
+                      <a:round/>
+                      <a:headEnd type="none" w="med" len="med"/>
+                      <a:tailEnd type="none" w="med" len="med"/>
+                    </a:lnT>
+                    <a:lnB w="38100" cap="flat" cmpd="sng" algn="ctr">
+                      <a:solidFill>
+                        <a:srgbClr val="FF0000"/>
+                      </a:solidFill>
+                      <a:prstDash val="solid"/>
+                      <a:round/>
+                      <a:headEnd type="none" w="med" len="med"/>
+                      <a:tailEnd type="none" w="med" len="med"/>
+                    </a:lnB>
+                    <a:noFill/>
+                  </a:tcPr>
+                </a:tc>
+                <a:tc>
+                  <a:txBody>
+                    <a:bodyPr/>
+                    <a:lstStyle/>
+                    <a:p>
+                      <a:pPr algn="ctr"/>
+                      <a:r>
+                        <a:rPr lang="fr-FR" dirty="0">
+                          <a:solidFill>
+                            <a:srgbClr val="FF0000"/>
+                          </a:solidFill>
+                        </a:rPr>
+                        <a:t>2</a:t>
+                      </a:r>
+                    </a:p>
+                  </a:txBody>
+                  <a:tcPr>
+                    <a:lnL w="38100" cap="flat" cmpd="sng" algn="ctr">
+                      <a:solidFill>
+                        <a:srgbClr val="FF0000"/>
+                      </a:solidFill>
+                      <a:prstDash val="solid"/>
+                      <a:round/>
+                      <a:headEnd type="none" w="med" len="med"/>
+                      <a:tailEnd type="none" w="med" len="med"/>
+                    </a:lnL>
+                    <a:lnR w="38100" cap="flat" cmpd="sng" algn="ctr">
+                      <a:solidFill>
+                        <a:srgbClr val="FF0000"/>
+                      </a:solidFill>
+                      <a:prstDash val="solid"/>
+                      <a:round/>
+                      <a:headEnd type="none" w="med" len="med"/>
+                      <a:tailEnd type="none" w="med" len="med"/>
+                    </a:lnR>
+                    <a:lnT w="38100" cap="flat" cmpd="sng" algn="ctr">
+                      <a:solidFill>
+                        <a:srgbClr val="FF0000"/>
+                      </a:solidFill>
+                      <a:prstDash val="solid"/>
+                      <a:round/>
+                      <a:headEnd type="none" w="med" len="med"/>
+                      <a:tailEnd type="none" w="med" len="med"/>
+                    </a:lnT>
+                    <a:lnB w="38100" cap="flat" cmpd="sng" algn="ctr">
+                      <a:solidFill>
+                        <a:srgbClr val="FF0000"/>
+                      </a:solidFill>
+                      <a:prstDash val="solid"/>
+                      <a:round/>
+                      <a:headEnd type="none" w="med" len="med"/>
+                      <a:tailEnd type="none" w="med" len="med"/>
+                    </a:lnB>
+                    <a:noFill/>
+                  </a:tcPr>
+                </a:tc>
+                <a:tc>
+                  <a:txBody>
+                    <a:bodyPr/>
+                    <a:lstStyle/>
+                    <a:p>
+                      <a:pPr algn="ctr"/>
+                      <a:r>
+                        <a:rPr lang="fr-FR" dirty="0">
+                          <a:solidFill>
+                            <a:srgbClr val="FF0000"/>
+                          </a:solidFill>
+                        </a:rPr>
+                        <a:t>3</a:t>
+                      </a:r>
+                    </a:p>
+                  </a:txBody>
+                  <a:tcPr>
+                    <a:lnL w="38100" cap="flat" cmpd="sng" algn="ctr">
+                      <a:solidFill>
+                        <a:srgbClr val="FF0000"/>
+                      </a:solidFill>
+                      <a:prstDash val="solid"/>
+                      <a:round/>
+                      <a:headEnd type="none" w="med" len="med"/>
+                      <a:tailEnd type="none" w="med" len="med"/>
+                    </a:lnL>
+                    <a:lnR w="38100" cap="flat" cmpd="sng" algn="ctr">
+                      <a:solidFill>
+                        <a:srgbClr val="FF0000"/>
+                      </a:solidFill>
+                      <a:prstDash val="solid"/>
+                      <a:round/>
+                      <a:headEnd type="none" w="med" len="med"/>
+                      <a:tailEnd type="none" w="med" len="med"/>
+                    </a:lnR>
+                    <a:lnT w="38100" cap="flat" cmpd="sng" algn="ctr">
+                      <a:solidFill>
+                        <a:srgbClr val="FF0000"/>
+                      </a:solidFill>
+                      <a:prstDash val="solid"/>
+                      <a:round/>
+                      <a:headEnd type="none" w="med" len="med"/>
+                      <a:tailEnd type="none" w="med" len="med"/>
+                    </a:lnT>
+                    <a:lnB w="38100" cap="flat" cmpd="sng" algn="ctr">
+                      <a:solidFill>
+                        <a:srgbClr val="FF0000"/>
+                      </a:solidFill>
+                      <a:prstDash val="solid"/>
+                      <a:round/>
+                      <a:headEnd type="none" w="med" len="med"/>
+                      <a:tailEnd type="none" w="med" len="med"/>
+                    </a:lnB>
+                    <a:noFill/>
+                  </a:tcPr>
+                </a:tc>
+                <a:extLst>
+                  <a:ext uri="{0D108BD9-81ED-4DB2-BD59-A6C34878D82A}">
+                    <a16:rowId xmlns:a16="http://schemas.microsoft.com/office/drawing/2014/main" val="497597101"/>
+                  </a:ext>
+                </a:extLst>
+              </a:tr>
+            </a:tbl>
+          </a:graphicData>
+        </a:graphic>
+      </p:graphicFrame>
+      <p:sp>
+        <p:nvSpPr>
+          <p:cNvPr id="7" name="ZoneTexte 6">
+            <a:extLst>
+              <a:ext uri="{FF2B5EF4-FFF2-40B4-BE49-F238E27FC236}">
+                <a16:creationId xmlns:a16="http://schemas.microsoft.com/office/drawing/2014/main" id="{CD7AE935-B8A9-4D57-97F2-6AAB9B21AF01}"/>
+              </a:ext>
+            </a:extLst>
+          </p:cNvPr>
+          <p:cNvSpPr txBox="1"/>
+          <p:nvPr/>
+        </p:nvSpPr>
+        <p:spPr>
+          <a:xfrm>
+            <a:off x="9803892" y="5959839"/>
+            <a:ext cx="1664677" cy="523220"/>
+          </a:xfrm>
+          <a:prstGeom prst="rect">
+            <a:avLst/>
+          </a:prstGeom>
+          <a:noFill/>
+        </p:spPr>
+        <p:txBody>
+          <a:bodyPr wrap="square">
+            <a:spAutoFit/>
+          </a:bodyPr>
+          <a:lstStyle/>
+          <a:p>
+            <a:pPr algn="ctr"/>
+            <a:r>
+              <a:rPr lang="fr-FR" sz="2800" b="1" dirty="0" err="1">
+                <a:solidFill>
+                  <a:srgbClr val="FF0000"/>
+                </a:solidFill>
+              </a:rPr>
+              <a:t>argc</a:t>
+            </a:r>
+            <a:r>
+              <a:rPr lang="fr-FR" sz="2800" b="1" dirty="0">
+                <a:solidFill>
+                  <a:srgbClr val="FF0000"/>
+                </a:solidFill>
+              </a:rPr>
+              <a:t> = 4</a:t>
+            </a:r>
+            <a:endParaRPr lang="fr-FR" sz="2800" b="1" dirty="0"/>
+          </a:p>
+        </p:txBody>
+      </p:sp>
+    </p:spTree>
+    <p:extLst>
+      <p:ext uri="{BB962C8B-B14F-4D97-AF65-F5344CB8AC3E}">
+        <p14:creationId xmlns:p14="http://schemas.microsoft.com/office/powerpoint/2010/main" val="2046497492"/>
+      </p:ext>
+    </p:extLst>
+  </p:cSld>
+  <p:clrMapOvr>
+    <a:masterClrMapping/>
+  </p:clrMapOvr>
+  <p:timing>
+    <p:tnLst>
+      <p:par>
+        <p:cTn id="1" dur="indefinite" restart="never" nodeType="tmRoot">
+          <p:childTnLst>
+            <p:seq concurrent="1" nextAc="seek">
+              <p:cTn id="2" dur="indefinite" nodeType="mainSeq">
+                <p:childTnLst>
+                  <p:par>
+                    <p:cTn id="3" fill="hold">
+                      <p:stCondLst>
+                        <p:cond delay="indefinite"/>
+                      </p:stCondLst>
+                      <p:childTnLst>
+                        <p:par>
+                          <p:cTn id="4" fill="hold">
+                            <p:stCondLst>
+                              <p:cond delay="0"/>
+                            </p:stCondLst>
+                            <p:childTnLst>
+                              <p:par>
+                                <p:cTn id="5" presetID="2" presetClass="entr" presetSubtype="4" fill="hold" nodeType="clickEffect">
+                                  <p:stCondLst>
+                                    <p:cond delay="0"/>
+                                  </p:stCondLst>
+                                  <p:childTnLst>
+                                    <p:set>
+                                      <p:cBhvr>
+                                        <p:cTn id="6" dur="1" fill="hold">
+                                          <p:stCondLst>
+                                            <p:cond delay="0"/>
+                                          </p:stCondLst>
+                                        </p:cTn>
+                                        <p:tgtEl>
+                                          <p:spTgt spid="4"/>
+                                        </p:tgtEl>
+                                        <p:attrNameLst>
+                                          <p:attrName>style.visibility</p:attrName>
+                                        </p:attrNameLst>
+                                      </p:cBhvr>
+                                      <p:to>
+                                        <p:strVal val="visible"/>
+                                      </p:to>
+                                    </p:set>
+                                    <p:anim calcmode="lin" valueType="num">
+                                      <p:cBhvr additive="base">
+                                        <p:cTn id="7" dur="500" fill="hold"/>
+                                        <p:tgtEl>
+                                          <p:spTgt spid="4"/>
+                                        </p:tgtEl>
+                                        <p:attrNameLst>
+                                          <p:attrName>ppt_x</p:attrName>
+                                        </p:attrNameLst>
+                                      </p:cBhvr>
+                                      <p:tavLst>
+                                        <p:tav tm="0">
+                                          <p:val>
+                                            <p:strVal val="#ppt_x"/>
+                                          </p:val>
+                                        </p:tav>
+                                        <p:tav tm="100000">
+                                          <p:val>
+                                            <p:strVal val="#ppt_x"/>
+                                          </p:val>
+                                        </p:tav>
+                                      </p:tavLst>
+                                    </p:anim>
+                                    <p:anim calcmode="lin" valueType="num">
+                                      <p:cBhvr additive="base">
+                                        <p:cTn id="8" dur="500" fill="hold"/>
+                                        <p:tgtEl>
+                                          <p:spTgt spid="4"/>
+                                        </p:tgtEl>
+                                        <p:attrNameLst>
+                                          <p:attrName>ppt_y</p:attrName>
+                                        </p:attrNameLst>
+                                      </p:cBhvr>
+                                      <p:tavLst>
+                                        <p:tav tm="0">
+                                          <p:val>
+                                            <p:strVal val="1+#ppt_h/2"/>
+                                          </p:val>
+                                        </p:tav>
+                                        <p:tav tm="100000">
+                                          <p:val>
+                                            <p:strVal val="#ppt_y"/>
+                                          </p:val>
+                                        </p:tav>
+                                      </p:tavLst>
+                                    </p:anim>
+                                  </p:childTnLst>
+                                </p:cTn>
+                              </p:par>
+                            </p:childTnLst>
+                          </p:cTn>
+                        </p:par>
+                      </p:childTnLst>
+                    </p:cTn>
+                  </p:par>
+                  <p:par>
+                    <p:cTn id="9" fill="hold">
+                      <p:stCondLst>
+                        <p:cond delay="indefinite"/>
+                      </p:stCondLst>
+                      <p:childTnLst>
+                        <p:par>
+                          <p:cTn id="10" fill="hold">
+                            <p:stCondLst>
+                              <p:cond delay="0"/>
+                            </p:stCondLst>
+                            <p:childTnLst>
+                              <p:par>
+                                <p:cTn id="11" presetID="10" presetClass="entr" presetSubtype="0" fill="hold" nodeType="clickEffect">
+                                  <p:stCondLst>
+                                    <p:cond delay="0"/>
+                                  </p:stCondLst>
+                                  <p:childTnLst>
+                                    <p:set>
+                                      <p:cBhvr>
+                                        <p:cTn id="12" dur="1" fill="hold">
+                                          <p:stCondLst>
+                                            <p:cond delay="0"/>
+                                          </p:stCondLst>
+                                        </p:cTn>
+                                        <p:tgtEl>
+                                          <p:spTgt spid="5"/>
+                                        </p:tgtEl>
+                                        <p:attrNameLst>
+                                          <p:attrName>style.visibility</p:attrName>
+                                        </p:attrNameLst>
+                                      </p:cBhvr>
+                                      <p:to>
+                                        <p:strVal val="visible"/>
+                                      </p:to>
+                                    </p:set>
+                                    <p:animEffect transition="in" filter="fade">
+                                      <p:cBhvr>
+                                        <p:cTn id="13" dur="500"/>
+                                        <p:tgtEl>
+                                          <p:spTgt spid="5"/>
+                                        </p:tgtEl>
+                                      </p:cBhvr>
+                                    </p:animEffect>
+                                  </p:childTnLst>
+                                </p:cTn>
+                              </p:par>
+                              <p:par>
+                                <p:cTn id="14" presetID="10" presetClass="entr" presetSubtype="0" fill="hold" grpId="0" nodeType="withEffect">
+                                  <p:stCondLst>
+                                    <p:cond delay="0"/>
+                                  </p:stCondLst>
+                                  <p:childTnLst>
+                                    <p:set>
+                                      <p:cBhvr>
+                                        <p:cTn id="15" dur="1" fill="hold">
+                                          <p:stCondLst>
+                                            <p:cond delay="0"/>
+                                          </p:stCondLst>
+                                        </p:cTn>
+                                        <p:tgtEl>
+                                          <p:spTgt spid="7"/>
+                                        </p:tgtEl>
+                                        <p:attrNameLst>
+                                          <p:attrName>style.visibility</p:attrName>
+                                        </p:attrNameLst>
+                                      </p:cBhvr>
+                                      <p:to>
+                                        <p:strVal val="visible"/>
+                                      </p:to>
+                                    </p:set>
+                                    <p:animEffect transition="in" filter="fade">
+                                      <p:cBhvr>
+                                        <p:cTn id="16" dur="500"/>
+                                        <p:tgtEl>
+                                          <p:spTgt spid="7"/>
+                                        </p:tgtEl>
+                                      </p:cBhvr>
+                                    </p:animEffect>
+                                  </p:childTnLst>
+                                </p:cTn>
+                              </p:par>
+                            </p:childTnLst>
+                          </p:cTn>
+                        </p:par>
+                      </p:childTnLst>
+                    </p:cTn>
+                  </p:par>
+                </p:childTnLst>
+              </p:cTn>
+              <p:prevCondLst>
+                <p:cond evt="onPrev" delay="0">
+                  <p:tgtEl>
+                    <p:sldTgt/>
+                  </p:tgtEl>
+                </p:cond>
+              </p:prevCondLst>
+              <p:nextCondLst>
+                <p:cond evt="onNext" delay="0">
+                  <p:tgtEl>
+                    <p:sldTgt/>
+                  </p:tgtEl>
+                </p:cond>
+              </p:nextCondLst>
+            </p:seq>
+          </p:childTnLst>
+        </p:cTn>
+      </p:par>
+    </p:tnLst>
+    <p:bldLst>
+      <p:bldP spid="7" grpId="0"/>
+    </p:bldLst>
+  </p:timing>
+</p:sld>
+</file>
+
 <file path=ppt/slides/slide3.xml><?xml version="1.0" encoding="utf-8"?>
 <p:sld xmlns:a="http://schemas.openxmlformats.org/drawingml/2006/main" xmlns:r="http://schemas.openxmlformats.org/officeDocument/2006/relationships" xmlns:p="http://schemas.openxmlformats.org/presentationml/2006/main">
   <p:cSld>

</xml_diff>